<commit_message>
Small changes on Presentation/Team_Feynman_Game_Presentation.pptx. Added the third image in Screens/ThirdScreen.png.
</commit_message>
<xml_diff>
--- a/Presentation/Team_Feynman_Game_Presentation.pptx
+++ b/Presentation/Team_Feynman_Game_Presentation.pptx
@@ -120,7 +120,7 @@
   </p:defaultTextStyle>
   <p:extLst>
     <p:ext uri="{EFAFB233-063F-42B5-8137-9DF3F51BA10A}">
-      <p15:sldGuideLst xmlns="" xmlns:p15="http://schemas.microsoft.com/office/powerpoint/2012/main">
+      <p15:sldGuideLst xmlns:p15="http://schemas.microsoft.com/office/powerpoint/2012/main" xmlns="">
         <p15:guide id="1" orient="horz" pos="2160" userDrawn="1">
           <p15:clr>
             <a:srgbClr val="A4A3A4"/>
@@ -134,7 +134,7 @@
       </p15:sldGuideLst>
     </p:ext>
     <p:ext uri="{2D200454-40CA-4A62-9FC3-DE9A4176ACB9}">
-      <p15:notesGuideLst xmlns="" xmlns:p15="http://schemas.microsoft.com/office/powerpoint/2012/main">
+      <p15:notesGuideLst xmlns:p15="http://schemas.microsoft.com/office/powerpoint/2012/main" xmlns="">
         <p15:guide id="1" orient="horz" pos="2880">
           <p15:clr>
             <a:srgbClr val="A4A3A4"/>
@@ -234,7 +234,7 @@
             <a:fld id="{FE5B4EDC-59C0-49C7-8ADA-5A781B329E02}" type="datetimeFigureOut">
               <a:rPr lang="en-US"/>
               <a:pPr/>
-              <a:t>14-Jun-16</a:t>
+              <a:t>15-Jun-16</a:t>
             </a:fld>
             <a:endParaRPr dirty="0"/>
           </a:p>
@@ -341,7 +341,7 @@
     </p:spTree>
     <p:extLst>
       <p:ext uri="{BB962C8B-B14F-4D97-AF65-F5344CB8AC3E}">
-        <p14:creationId xmlns="" xmlns:p14="http://schemas.microsoft.com/office/powerpoint/2010/main" val="4232045756"/>
+        <p14:creationId xmlns:p14="http://schemas.microsoft.com/office/powerpoint/2010/main" xmlns="" val="4232045756"/>
       </p:ext>
     </p:extLst>
   </p:cSld>
@@ -433,7 +433,7 @@
             <a:fld id="{F2D8D46A-B586-417D-BFBD-8C8FE0AAF762}" type="datetimeFigureOut">
               <a:rPr lang="en-US" smtClean="0"/>
               <a:pPr/>
-              <a:t>14-Jun-16</a:t>
+              <a:t>15-Jun-16</a:t>
             </a:fld>
             <a:endParaRPr lang="en-US"/>
           </a:p>
@@ -632,7 +632,7 @@
     </p:spTree>
     <p:extLst>
       <p:ext uri="{BB962C8B-B14F-4D97-AF65-F5344CB8AC3E}">
-        <p14:creationId xmlns="" xmlns:p14="http://schemas.microsoft.com/office/powerpoint/2010/main" val="276705785"/>
+        <p14:creationId xmlns:p14="http://schemas.microsoft.com/office/powerpoint/2010/main" xmlns="" val="276705785"/>
       </p:ext>
     </p:extLst>
   </p:cSld>
@@ -858,7 +858,7 @@
     </p:spTree>
     <p:extLst>
       <p:ext uri="{BB962C8B-B14F-4D97-AF65-F5344CB8AC3E}">
-        <p14:creationId xmlns="" xmlns:p14="http://schemas.microsoft.com/office/powerpoint/2010/main" val="914151531"/>
+        <p14:creationId xmlns:p14="http://schemas.microsoft.com/office/powerpoint/2010/main" xmlns="" val="914151531"/>
       </p:ext>
     </p:extLst>
   </p:cSld>
@@ -995,7 +995,7 @@
     </p:spTree>
     <p:extLst>
       <p:ext uri="{BB962C8B-B14F-4D97-AF65-F5344CB8AC3E}">
-        <p14:creationId xmlns="" xmlns:p14="http://schemas.microsoft.com/office/powerpoint/2010/main" val="1134749778"/>
+        <p14:creationId xmlns:p14="http://schemas.microsoft.com/office/powerpoint/2010/main" xmlns="" val="1134749778"/>
       </p:ext>
     </p:extLst>
   </p:cSld>
@@ -1132,7 +1132,7 @@
     </p:spTree>
     <p:extLst>
       <p:ext uri="{BB962C8B-B14F-4D97-AF65-F5344CB8AC3E}">
-        <p14:creationId xmlns="" xmlns:p14="http://schemas.microsoft.com/office/powerpoint/2010/main" val="1134749778"/>
+        <p14:creationId xmlns:p14="http://schemas.microsoft.com/office/powerpoint/2010/main" xmlns="" val="1134749778"/>
       </p:ext>
     </p:extLst>
   </p:cSld>
@@ -1269,7 +1269,7 @@
     </p:spTree>
     <p:extLst>
       <p:ext uri="{BB962C8B-B14F-4D97-AF65-F5344CB8AC3E}">
-        <p14:creationId xmlns="" xmlns:p14="http://schemas.microsoft.com/office/powerpoint/2010/main" val="1134749778"/>
+        <p14:creationId xmlns:p14="http://schemas.microsoft.com/office/powerpoint/2010/main" xmlns="" val="1134749778"/>
       </p:ext>
     </p:extLst>
   </p:cSld>
@@ -1406,7 +1406,7 @@
     </p:spTree>
     <p:extLst>
       <p:ext uri="{BB962C8B-B14F-4D97-AF65-F5344CB8AC3E}">
-        <p14:creationId xmlns="" xmlns:p14="http://schemas.microsoft.com/office/powerpoint/2010/main" val="1134749778"/>
+        <p14:creationId xmlns:p14="http://schemas.microsoft.com/office/powerpoint/2010/main" xmlns="" val="1134749778"/>
       </p:ext>
     </p:extLst>
   </p:cSld>
@@ -1543,7 +1543,7 @@
     </p:spTree>
     <p:extLst>
       <p:ext uri="{BB962C8B-B14F-4D97-AF65-F5344CB8AC3E}">
-        <p14:creationId xmlns="" xmlns:p14="http://schemas.microsoft.com/office/powerpoint/2010/main" val="1134749778"/>
+        <p14:creationId xmlns:p14="http://schemas.microsoft.com/office/powerpoint/2010/main" xmlns="" val="1134749778"/>
       </p:ext>
     </p:extLst>
   </p:cSld>
@@ -1680,7 +1680,7 @@
     </p:spTree>
     <p:extLst>
       <p:ext uri="{BB962C8B-B14F-4D97-AF65-F5344CB8AC3E}">
-        <p14:creationId xmlns="" xmlns:p14="http://schemas.microsoft.com/office/powerpoint/2010/main" val="1134749778"/>
+        <p14:creationId xmlns:p14="http://schemas.microsoft.com/office/powerpoint/2010/main" xmlns="" val="1134749778"/>
       </p:ext>
     </p:extLst>
   </p:cSld>
@@ -1817,7 +1817,7 @@
     </p:spTree>
     <p:extLst>
       <p:ext uri="{BB962C8B-B14F-4D97-AF65-F5344CB8AC3E}">
-        <p14:creationId xmlns="" xmlns:p14="http://schemas.microsoft.com/office/powerpoint/2010/main" val="1134749778"/>
+        <p14:creationId xmlns:p14="http://schemas.microsoft.com/office/powerpoint/2010/main" xmlns="" val="1134749778"/>
       </p:ext>
     </p:extLst>
   </p:cSld>
@@ -1954,7 +1954,7 @@
     </p:spTree>
     <p:extLst>
       <p:ext uri="{BB962C8B-B14F-4D97-AF65-F5344CB8AC3E}">
-        <p14:creationId xmlns="" xmlns:p14="http://schemas.microsoft.com/office/powerpoint/2010/main" val="1134749778"/>
+        <p14:creationId xmlns:p14="http://schemas.microsoft.com/office/powerpoint/2010/main" xmlns="" val="1134749778"/>
       </p:ext>
     </p:extLst>
   </p:cSld>
@@ -2458,7 +2458,7 @@
     </p:spTree>
     <p:extLst>
       <p:ext uri="{BB962C8B-B14F-4D97-AF65-F5344CB8AC3E}">
-        <p14:creationId xmlns="" xmlns:p14="http://schemas.microsoft.com/office/powerpoint/2010/main" val="1847488592"/>
+        <p14:creationId xmlns:p14="http://schemas.microsoft.com/office/powerpoint/2010/main" xmlns="" val="1847488592"/>
       </p:ext>
     </p:extLst>
   </p:cSld>
@@ -2466,7 +2466,7 @@
     <a:masterClrMapping/>
   </p:clrMapOvr>
   <mc:AlternateContent xmlns:mc="http://schemas.openxmlformats.org/markup-compatibility/2006">
-    <mc:Choice xmlns="" xmlns:p14="http://schemas.microsoft.com/office/powerpoint/2010/main" Requires="p14">
+    <mc:Choice xmlns:p14="http://schemas.microsoft.com/office/powerpoint/2010/main" xmlns="" Requires="p14">
       <p:transition p14:dur="0"/>
     </mc:Choice>
     <mc:Fallback>
@@ -2536,7 +2536,7 @@
             <a:fld id="{055373AC-9AA7-423B-BA00-BA1C74164DBD}" type="datetime1">
               <a:rPr lang="en-US" smtClean="0"/>
               <a:pPr/>
-              <a:t>14-Jun-16</a:t>
+              <a:t>15-Jun-16</a:t>
             </a:fld>
             <a:endParaRPr lang="en-US" dirty="0"/>
           </a:p>
@@ -2772,7 +2772,7 @@
     </p:spTree>
     <p:extLst>
       <p:ext uri="{BB962C8B-B14F-4D97-AF65-F5344CB8AC3E}">
-        <p14:creationId xmlns="" xmlns:p14="http://schemas.microsoft.com/office/powerpoint/2010/main" val="1406769010"/>
+        <p14:creationId xmlns:p14="http://schemas.microsoft.com/office/powerpoint/2010/main" xmlns="" val="1406769010"/>
       </p:ext>
     </p:extLst>
   </p:cSld>
@@ -2780,7 +2780,7 @@
     <a:masterClrMapping/>
   </p:clrMapOvr>
   <mc:AlternateContent xmlns:mc="http://schemas.openxmlformats.org/markup-compatibility/2006">
-    <mc:Choice xmlns="" xmlns:p14="http://schemas.microsoft.com/office/powerpoint/2010/main" Requires="p14">
+    <mc:Choice xmlns:p14="http://schemas.microsoft.com/office/powerpoint/2010/main" xmlns="" Requires="p14">
       <p:transition p14:dur="0"/>
     </mc:Choice>
     <mc:Fallback>
@@ -2999,7 +2999,7 @@
     </p:spTree>
     <p:extLst>
       <p:ext uri="{BB962C8B-B14F-4D97-AF65-F5344CB8AC3E}">
-        <p14:creationId xmlns="" xmlns:p14="http://schemas.microsoft.com/office/powerpoint/2010/main" val="3616330612"/>
+        <p14:creationId xmlns:p14="http://schemas.microsoft.com/office/powerpoint/2010/main" xmlns="" val="3616330612"/>
       </p:ext>
     </p:extLst>
   </p:cSld>
@@ -3007,7 +3007,7 @@
     <a:masterClrMapping/>
   </p:clrMapOvr>
   <mc:AlternateContent xmlns:mc="http://schemas.openxmlformats.org/markup-compatibility/2006">
-    <mc:Choice xmlns="" xmlns:p14="http://schemas.microsoft.com/office/powerpoint/2010/main" Requires="p14">
+    <mc:Choice xmlns:p14="http://schemas.microsoft.com/office/powerpoint/2010/main" xmlns="" Requires="p14">
       <p:transition p14:dur="0"/>
     </mc:Choice>
     <mc:Fallback>
@@ -3044,7 +3044,7 @@
     </p:spTree>
     <p:extLst>
       <p:ext uri="{BB962C8B-B14F-4D97-AF65-F5344CB8AC3E}">
-        <p14:creationId xmlns="" xmlns:p14="http://schemas.microsoft.com/office/powerpoint/2010/main" val="2172478503"/>
+        <p14:creationId xmlns:p14="http://schemas.microsoft.com/office/powerpoint/2010/main" xmlns="" val="2172478503"/>
       </p:ext>
     </p:extLst>
   </p:cSld>
@@ -3052,7 +3052,7 @@
     <a:masterClrMapping/>
   </p:clrMapOvr>
   <mc:AlternateContent xmlns:mc="http://schemas.openxmlformats.org/markup-compatibility/2006">
-    <mc:Choice xmlns="" xmlns:p14="http://schemas.microsoft.com/office/powerpoint/2010/main" Requires="p14">
+    <mc:Choice xmlns:p14="http://schemas.microsoft.com/office/powerpoint/2010/main" xmlns="" Requires="p14">
       <p:transition p14:dur="0"/>
     </mc:Choice>
     <mc:Fallback>
@@ -3136,7 +3136,7 @@
             <a:fld id="{055373AC-9AA7-423B-BA00-BA1C74164DBD}" type="datetime1">
               <a:rPr lang="en-US" smtClean="0"/>
               <a:pPr/>
-              <a:t>14-Jun-16</a:t>
+              <a:t>15-Jun-16</a:t>
             </a:fld>
             <a:endParaRPr lang="en-US" dirty="0"/>
           </a:p>
@@ -3319,7 +3319,7 @@
     </p:spTree>
     <p:extLst>
       <p:ext uri="{BB962C8B-B14F-4D97-AF65-F5344CB8AC3E}">
-        <p14:creationId xmlns="" xmlns:p14="http://schemas.microsoft.com/office/powerpoint/2010/main" val="1395275884"/>
+        <p14:creationId xmlns:p14="http://schemas.microsoft.com/office/powerpoint/2010/main" xmlns="" val="1395275884"/>
       </p:ext>
     </p:extLst>
   </p:cSld>
@@ -3331,7 +3331,7 @@
     <p:sldLayoutId id="2147483667" r:id="rId4"/>
   </p:sldLayoutIdLst>
   <mc:AlternateContent xmlns:mc="http://schemas.openxmlformats.org/markup-compatibility/2006">
-    <mc:Choice xmlns="" xmlns:p14="http://schemas.microsoft.com/office/powerpoint/2010/main" Requires="p14">
+    <mc:Choice xmlns:p14="http://schemas.microsoft.com/office/powerpoint/2010/main" xmlns="" Requires="p14">
       <p:transition p14:dur="0"/>
     </mc:Choice>
     <mc:Fallback>
@@ -3679,7 +3679,7 @@
   </p:txStyles>
   <p:extLst mod="1">
     <p:ext uri="{27BBF7A9-308A-43DC-89C8-2F10F3537804}">
-      <p15:sldGuideLst xmlns="" xmlns:p15="http://schemas.microsoft.com/office/powerpoint/2012/main">
+      <p15:sldGuideLst xmlns:p15="http://schemas.microsoft.com/office/powerpoint/2012/main" xmlns="">
         <p15:guide id="1" orient="horz" pos="2160" userDrawn="1">
           <p15:clr>
             <a:srgbClr val="F26B43"/>
@@ -3738,15 +3738,7 @@
             <a:pPr algn="ctr"/>
             <a:r>
               <a:rPr lang="en-US" dirty="0" smtClean="0"/>
-              <a:t>The adventures </a:t>
-            </a:r>
-            <a:r>
-              <a:rPr lang="en-US" dirty="0" smtClean="0"/>
-              <a:t>of Professor </a:t>
-            </a:r>
-            <a:r>
-              <a:rPr lang="en-US" dirty="0" smtClean="0"/>
-              <a:t>Feynman</a:t>
+              <a:t>The adventures of Professor Feynman</a:t>
             </a:r>
             <a:endParaRPr lang="en-US" dirty="0"/>
           </a:p>
@@ -3777,11 +3769,7 @@
             <a:pPr algn="ctr"/>
             <a:r>
               <a:rPr lang="en-US" dirty="0" smtClean="0"/>
-              <a:t>Team</a:t>
-            </a:r>
-            <a:r>
-              <a:rPr lang="en-US" dirty="0" smtClean="0"/>
-              <a:t> </a:t>
+              <a:t>Team </a:t>
             </a:r>
             <a:r>
               <a:rPr lang="en-US" b="1" dirty="0" smtClean="0"/>
@@ -3852,11 +3840,7 @@
             </a:r>
             <a:r>
               <a:rPr lang="en-US" dirty="0" smtClean="0"/>
-              <a:t> </a:t>
-            </a:r>
-            <a:r>
-              <a:rPr lang="en-US" dirty="0" smtClean="0"/>
-              <a:t>, </a:t>
+              <a:t> , </a:t>
             </a:r>
             <a:r>
               <a:rPr lang="en-US" dirty="0" err="1" smtClean="0"/>
@@ -3864,11 +3848,7 @@
             </a:r>
             <a:r>
               <a:rPr lang="en-US" dirty="0" smtClean="0"/>
-              <a:t> </a:t>
-            </a:r>
-            <a:r>
-              <a:rPr lang="en-US" dirty="0" smtClean="0"/>
-              <a:t> </a:t>
+              <a:t>  </a:t>
             </a:r>
             <a:endParaRPr lang="en-US" dirty="0"/>
           </a:p>
@@ -3897,11 +3877,7 @@
           <a:p>
             <a:r>
               <a:rPr lang="en-US" dirty="0" smtClean="0"/>
-              <a:t> </a:t>
-            </a:r>
-            <a:r>
-              <a:rPr lang="en-US" dirty="0" smtClean="0"/>
-              <a:t>https://github.com/Team-Feynman/The-Game</a:t>
+              <a:t> https://github.com/Team-Feynman/The-Game</a:t>
             </a:r>
             <a:endParaRPr lang="bg-BG" dirty="0"/>
           </a:p>
@@ -3936,7 +3912,7 @@
     </p:spTree>
     <p:extLst>
       <p:ext uri="{BB962C8B-B14F-4D97-AF65-F5344CB8AC3E}">
-        <p14:creationId xmlns="" xmlns:p14="http://schemas.microsoft.com/office/powerpoint/2010/main" val="3215379390"/>
+        <p14:creationId xmlns:p14="http://schemas.microsoft.com/office/powerpoint/2010/main" xmlns="" val="3215379390"/>
       </p:ext>
     </p:extLst>
   </p:cSld>
@@ -3944,7 +3920,7 @@
     <a:masterClrMapping/>
   </p:clrMapOvr>
   <mc:AlternateContent xmlns:mc="http://schemas.openxmlformats.org/markup-compatibility/2006">
-    <mc:Choice xmlns="" xmlns:p14="http://schemas.microsoft.com/office/powerpoint/2010/main" Requires="p14">
+    <mc:Choice xmlns:p14="http://schemas.microsoft.com/office/powerpoint/2010/main" xmlns="" Requires="p14">
       <p:transition p14:dur="0"/>
     </mc:Choice>
     <mc:Fallback>
@@ -4054,7 +4030,6 @@
               <a:rPr lang="en-US" dirty="0" smtClean="0"/>
               <a:t>Background and game scenarios</a:t>
             </a:r>
-            <a:endParaRPr lang="en-US" dirty="0" smtClean="0"/>
           </a:p>
           <a:p>
             <a:pPr>
@@ -4088,21 +4063,18 @@
               <a:rPr lang="en-US" dirty="0" smtClean="0"/>
               <a:t>Code examples</a:t>
             </a:r>
-            <a:endParaRPr lang="en-US" dirty="0" smtClean="0"/>
           </a:p>
           <a:p>
             <a:r>
               <a:rPr lang="en-US" dirty="0" smtClean="0"/>
               <a:t>Future work</a:t>
             </a:r>
-            <a:endParaRPr lang="en-US" dirty="0" smtClean="0"/>
           </a:p>
           <a:p>
             <a:r>
               <a:rPr lang="en-US" dirty="0" smtClean="0"/>
               <a:t>How we have worked</a:t>
             </a:r>
-            <a:endParaRPr lang="en-US" dirty="0" smtClean="0"/>
           </a:p>
           <a:p>
             <a:endParaRPr lang="en-US" dirty="0" smtClean="0"/>
@@ -4169,7 +4141,7 @@
     </p:spTree>
     <p:extLst>
       <p:ext uri="{BB962C8B-B14F-4D97-AF65-F5344CB8AC3E}">
-        <p14:creationId xmlns="" xmlns:p14="http://schemas.microsoft.com/office/powerpoint/2010/main" val="1646986932"/>
+        <p14:creationId xmlns:p14="http://schemas.microsoft.com/office/powerpoint/2010/main" xmlns="" val="1646986932"/>
       </p:ext>
     </p:extLst>
   </p:cSld>
@@ -4177,7 +4149,7 @@
     <a:masterClrMapping/>
   </p:clrMapOvr>
   <mc:AlternateContent xmlns:mc="http://schemas.openxmlformats.org/markup-compatibility/2006">
-    <mc:Choice xmlns="" xmlns:p14="http://schemas.microsoft.com/office/powerpoint/2010/main" Requires="p14">
+    <mc:Choice xmlns:p14="http://schemas.microsoft.com/office/powerpoint/2010/main" xmlns="" Requires="p14">
       <p:transition p14:dur="0"/>
     </mc:Choice>
     <mc:Fallback>
@@ -4266,11 +4238,7 @@
           <a:p>
             <a:r>
               <a:rPr lang="en-US" sz="3200" dirty="0" smtClean="0"/>
-              <a:t>To </a:t>
-            </a:r>
-            <a:r>
-              <a:rPr lang="en-US" sz="3200" dirty="0" smtClean="0"/>
-              <a:t>develop an interactive </a:t>
+              <a:t>To develop an interactive </a:t>
             </a:r>
             <a:r>
               <a:rPr lang="en-US" sz="3200" b="1" dirty="0" smtClean="0"/>
@@ -4280,7 +4248,6 @@
               <a:rPr lang="en-US" sz="3200" dirty="0" smtClean="0"/>
               <a:t> The game is based on several interesting stories, which are inspired from the real life achievements of Professor Richard Feynman. </a:t>
             </a:r>
-            <a:endParaRPr lang="en-US" sz="3200" dirty="0" smtClean="0"/>
           </a:p>
           <a:p>
             <a:pPr>
@@ -4348,7 +4315,7 @@
     </p:spTree>
     <p:extLst>
       <p:ext uri="{BB962C8B-B14F-4D97-AF65-F5344CB8AC3E}">
-        <p14:creationId xmlns="" xmlns:p14="http://schemas.microsoft.com/office/powerpoint/2010/main" val="1646986932"/>
+        <p14:creationId xmlns:p14="http://schemas.microsoft.com/office/powerpoint/2010/main" xmlns="" val="1646986932"/>
       </p:ext>
     </p:extLst>
   </p:cSld>
@@ -4356,7 +4323,7 @@
     <a:masterClrMapping/>
   </p:clrMapOvr>
   <mc:AlternateContent xmlns:mc="http://schemas.openxmlformats.org/markup-compatibility/2006">
-    <mc:Choice xmlns="" xmlns:p14="http://schemas.microsoft.com/office/powerpoint/2010/main" Requires="p14">
+    <mc:Choice xmlns:p14="http://schemas.microsoft.com/office/powerpoint/2010/main" xmlns="" Requires="p14">
       <p:transition p14:dur="0"/>
     </mc:Choice>
     <mc:Fallback>
@@ -4415,15 +4382,7 @@
             <a:pPr algn="ctr"/>
             <a:r>
               <a:rPr lang="en-US" dirty="0" smtClean="0"/>
-              <a:t>Background </a:t>
-            </a:r>
-            <a:r>
-              <a:rPr lang="en-US" dirty="0" smtClean="0"/>
-              <a:t>and game scenarios</a:t>
-            </a:r>
-            <a:r>
-              <a:rPr lang="en-US" dirty="0" smtClean="0"/>
-              <a:t/>
+              <a:t>Background and game scenarios</a:t>
             </a:r>
             <a:br>
               <a:rPr lang="en-US" dirty="0" smtClean="0"/>
@@ -4463,17 +4422,8 @@
             </a:r>
             <a:r>
               <a:rPr lang="en-US" sz="4000" dirty="0" smtClean="0"/>
-              <a:t>(1918 – 1988) </a:t>
-            </a:r>
-            <a:r>
-              <a:rPr lang="en-US" sz="4000" dirty="0" smtClean="0"/>
-              <a:t>was </a:t>
-            </a:r>
-            <a:r>
-              <a:rPr lang="en-US" sz="4000" dirty="0" smtClean="0"/>
-              <a:t>an American </a:t>
-            </a:r>
-            <a:endParaRPr lang="en-US" sz="4000" dirty="0" smtClean="0"/>
+              <a:t>(1918 – 1988) was an American </a:t>
+            </a:r>
           </a:p>
           <a:p>
             <a:pPr>
@@ -4481,15 +4431,7 @@
             </a:pPr>
             <a:r>
               <a:rPr lang="en-US" sz="4000" dirty="0" smtClean="0"/>
-              <a:t>theoretical </a:t>
-            </a:r>
-            <a:r>
-              <a:rPr lang="en-US" sz="4000" dirty="0" smtClean="0"/>
-              <a:t>physicist, </a:t>
-            </a:r>
-            <a:r>
-              <a:rPr lang="en-US" sz="4000" dirty="0" smtClean="0"/>
-              <a:t>who </a:t>
+              <a:t>theoretical physicist, who </a:t>
             </a:r>
             <a:r>
               <a:rPr lang="bg-BG" sz="4000" dirty="0" err="1" smtClean="0"/>
@@ -4565,11 +4507,7 @@
             </a:r>
             <a:r>
               <a:rPr lang="bg-BG" sz="4000" dirty="0" smtClean="0"/>
-              <a:t> </a:t>
-            </a:r>
-            <a:r>
-              <a:rPr lang="bg-BG" sz="4000" dirty="0" smtClean="0"/>
-              <a:t>1965 </a:t>
+              <a:t> 1965 </a:t>
             </a:r>
             <a:r>
               <a:rPr lang="bg-BG" sz="4000" dirty="0" err="1" smtClean="0"/>
@@ -4593,11 +4531,7 @@
             </a:r>
             <a:r>
               <a:rPr lang="bg-BG" sz="4000" dirty="0" smtClean="0"/>
-              <a:t> </a:t>
-            </a:r>
-            <a:r>
-              <a:rPr lang="bg-BG" sz="4000" dirty="0" smtClean="0"/>
-              <a:t>to </a:t>
+              <a:t> to </a:t>
             </a:r>
             <a:r>
               <a:rPr lang="bg-BG" sz="4000" dirty="0" err="1" smtClean="0"/>
@@ -4613,11 +4547,7 @@
             </a:r>
             <a:r>
               <a:rPr lang="bg-BG" sz="4000" dirty="0" smtClean="0"/>
-              <a:t> </a:t>
-            </a:r>
-            <a:r>
-              <a:rPr lang="bg-BG" sz="4000" dirty="0" smtClean="0"/>
-              <a:t>of </a:t>
+              <a:t> of </a:t>
             </a:r>
             <a:r>
               <a:rPr lang="bg-BG" sz="4000" dirty="0" err="1" smtClean="0"/>
@@ -5037,7 +4967,7 @@
     </p:spTree>
     <p:extLst>
       <p:ext uri="{BB962C8B-B14F-4D97-AF65-F5344CB8AC3E}">
-        <p14:creationId xmlns="" xmlns:p14="http://schemas.microsoft.com/office/powerpoint/2010/main" val="1646986932"/>
+        <p14:creationId xmlns:p14="http://schemas.microsoft.com/office/powerpoint/2010/main" xmlns="" val="1646986932"/>
       </p:ext>
     </p:extLst>
   </p:cSld>
@@ -5045,7 +4975,7 @@
     <a:masterClrMapping/>
   </p:clrMapOvr>
   <mc:AlternateContent xmlns:mc="http://schemas.openxmlformats.org/markup-compatibility/2006">
-    <mc:Choice xmlns="" xmlns:p14="http://schemas.microsoft.com/office/powerpoint/2010/main" Requires="p14">
+    <mc:Choice xmlns:p14="http://schemas.microsoft.com/office/powerpoint/2010/main" xmlns="" Requires="p14">
       <p:transition p14:dur="0"/>
     </mc:Choice>
     <mc:Fallback>
@@ -5134,8 +5064,57 @@
                   </a:schemeClr>
                 </a:solidFill>
               </a:rPr>
-              <a:t>Team collaboration </a:t>
-            </a:r>
+              <a:t>Team collaboration  and development tools: </a:t>
+            </a:r>
+            <a:endParaRPr lang="bg-BG" b="1" dirty="0" smtClean="0">
+              <a:solidFill>
+                <a:schemeClr val="tx2">
+                  <a:lumMod val="50000"/>
+                </a:schemeClr>
+              </a:solidFill>
+            </a:endParaRPr>
+          </a:p>
+          <a:p>
+            <a:pPr lvl="0"/>
+            <a:r>
+              <a:rPr lang="en-US" b="1" dirty="0" err="1" smtClean="0"/>
+              <a:t>GitHub</a:t>
+            </a:r>
+            <a:r>
+              <a:rPr lang="en-US" b="1" dirty="0" smtClean="0"/>
+              <a:t> repository</a:t>
+            </a:r>
+            <a:endParaRPr lang="bg-BG" dirty="0" smtClean="0"/>
+          </a:p>
+          <a:p>
+            <a:pPr lvl="0"/>
+            <a:r>
+              <a:rPr lang="en-US" b="1" dirty="0" err="1" smtClean="0"/>
+              <a:t>Trello</a:t>
+            </a:r>
+            <a:endParaRPr lang="bg-BG" dirty="0" smtClean="0"/>
+          </a:p>
+          <a:p>
+            <a:pPr lvl="0"/>
+            <a:r>
+              <a:rPr lang="en-US" b="1" dirty="0" smtClean="0"/>
+              <a:t>Skype – Team Feynman group</a:t>
+            </a:r>
+            <a:endParaRPr lang="bg-BG" dirty="0" smtClean="0"/>
+          </a:p>
+          <a:p>
+            <a:pPr lvl="0"/>
+            <a:r>
+              <a:rPr lang="en-US" b="1" dirty="0" err="1" smtClean="0"/>
+              <a:t>OneDrive</a:t>
+            </a:r>
+            <a:r>
+              <a:rPr lang="en-US" b="1" dirty="0" smtClean="0"/>
+              <a:t> temporary file storage</a:t>
+            </a:r>
+            <a:endParaRPr lang="bg-BG" dirty="0" smtClean="0"/>
+          </a:p>
+          <a:p>
             <a:r>
               <a:rPr lang="en-US" b="1" dirty="0" smtClean="0">
                 <a:solidFill>
@@ -5144,98 +5123,7 @@
                   </a:schemeClr>
                 </a:solidFill>
               </a:rPr>
-              <a:t> and development tools</a:t>
-            </a:r>
-            <a:r>
-              <a:rPr lang="en-US" b="1" dirty="0" smtClean="0">
-                <a:solidFill>
-                  <a:schemeClr val="tx2">
-                    <a:lumMod val="50000"/>
-                  </a:schemeClr>
-                </a:solidFill>
-              </a:rPr>
-              <a:t>: </a:t>
-            </a:r>
-            <a:endParaRPr lang="bg-BG" b="1" dirty="0" smtClean="0">
-              <a:solidFill>
-                <a:schemeClr val="tx2">
-                  <a:lumMod val="50000"/>
-                </a:schemeClr>
-              </a:solidFill>
-            </a:endParaRPr>
-          </a:p>
-          <a:p>
-            <a:pPr lvl="0"/>
-            <a:r>
-              <a:rPr lang="en-US" b="1" dirty="0" err="1" smtClean="0"/>
-              <a:t>GitHub</a:t>
-            </a:r>
-            <a:r>
-              <a:rPr lang="en-US" b="1" dirty="0" smtClean="0"/>
-              <a:t> </a:t>
-            </a:r>
-            <a:r>
-              <a:rPr lang="en-US" b="1" dirty="0" smtClean="0"/>
-              <a:t>repository</a:t>
-            </a:r>
-            <a:endParaRPr lang="bg-BG" dirty="0" smtClean="0"/>
-          </a:p>
-          <a:p>
-            <a:pPr lvl="0"/>
-            <a:r>
-              <a:rPr lang="en-US" b="1" dirty="0" err="1" smtClean="0"/>
-              <a:t>Trello</a:t>
-            </a:r>
-            <a:endParaRPr lang="bg-BG" dirty="0" smtClean="0"/>
-          </a:p>
-          <a:p>
-            <a:pPr lvl="0"/>
-            <a:r>
-              <a:rPr lang="en-US" b="1" dirty="0" smtClean="0"/>
-              <a:t>Skype – Team Feynman </a:t>
-            </a:r>
-            <a:r>
-              <a:rPr lang="en-US" b="1" dirty="0" smtClean="0"/>
-              <a:t>group</a:t>
-            </a:r>
-            <a:endParaRPr lang="bg-BG" dirty="0" smtClean="0"/>
-          </a:p>
-          <a:p>
-            <a:pPr lvl="0"/>
-            <a:r>
-              <a:rPr lang="en-US" b="1" dirty="0" err="1" smtClean="0"/>
-              <a:t>OneDrive</a:t>
-            </a:r>
-            <a:r>
-              <a:rPr lang="en-US" b="1" dirty="0" smtClean="0"/>
-              <a:t> temporary file </a:t>
-            </a:r>
-            <a:r>
-              <a:rPr lang="en-US" b="1" dirty="0" smtClean="0"/>
-              <a:t>storage</a:t>
-            </a:r>
-            <a:endParaRPr lang="bg-BG" dirty="0" smtClean="0"/>
-          </a:p>
-          <a:p>
-            <a:r>
-              <a:rPr lang="en-US" b="1" dirty="0" smtClean="0">
-                <a:solidFill>
-                  <a:schemeClr val="tx2">
-                    <a:lumMod val="50000"/>
-                  </a:schemeClr>
-                </a:solidFill>
-              </a:rPr>
-              <a:t>Platform</a:t>
-            </a:r>
-            <a:r>
-              <a:rPr lang="en-US" b="1" dirty="0" smtClean="0">
-                <a:solidFill>
-                  <a:schemeClr val="tx2">
-                    <a:lumMod val="50000"/>
-                  </a:schemeClr>
-                </a:solidFill>
-              </a:rPr>
-              <a:t>: </a:t>
+              <a:t>Platform: </a:t>
             </a:r>
             <a:r>
               <a:rPr lang="en-US" b="1" dirty="0" err="1" smtClean="0"/>
@@ -5243,11 +5131,7 @@
             </a:r>
             <a:r>
               <a:rPr lang="en-US" b="1" dirty="0" smtClean="0"/>
-              <a:t> </a:t>
-            </a:r>
-            <a:r>
-              <a:rPr lang="en-US" b="1" dirty="0" smtClean="0"/>
-              <a:t>3.5 for Visual studio.  </a:t>
+              <a:t> 3.5 for Visual studio.  </a:t>
             </a:r>
             <a:endParaRPr lang="bg-BG" dirty="0" smtClean="0"/>
           </a:p>
@@ -5297,7 +5181,7 @@
     </p:spTree>
     <p:extLst>
       <p:ext uri="{BB962C8B-B14F-4D97-AF65-F5344CB8AC3E}">
-        <p14:creationId xmlns="" xmlns:p14="http://schemas.microsoft.com/office/powerpoint/2010/main" val="1646986932"/>
+        <p14:creationId xmlns:p14="http://schemas.microsoft.com/office/powerpoint/2010/main" xmlns="" val="1646986932"/>
       </p:ext>
     </p:extLst>
   </p:cSld>
@@ -5305,7 +5189,7 @@
     <a:masterClrMapping/>
   </p:clrMapOvr>
   <mc:AlternateContent xmlns:mc="http://schemas.openxmlformats.org/markup-compatibility/2006">
-    <mc:Choice xmlns="" xmlns:p14="http://schemas.microsoft.com/office/powerpoint/2010/main" Requires="p14">
+    <mc:Choice xmlns:p14="http://schemas.microsoft.com/office/powerpoint/2010/main" xmlns="" Requires="p14">
       <p:transition p14:dur="0"/>
     </mc:Choice>
     <mc:Fallback>
@@ -5389,11 +5273,7 @@
             <a:pPr lvl="0"/>
             <a:r>
               <a:rPr lang="en-US" dirty="0" smtClean="0"/>
-              <a:t>Title screen with 2 buttons (Play and Quite) on the background and 2 objects (bomb and test tube</a:t>
-            </a:r>
-            <a:r>
-              <a:rPr lang="en-US" dirty="0" smtClean="0"/>
-              <a:t>)</a:t>
+              <a:t>Title screen with 2 buttons (Play and Quite) on the background and 2 objects (bomb and test tube)</a:t>
             </a:r>
             <a:endParaRPr lang="bg-BG" dirty="0" smtClean="0"/>
           </a:p>
@@ -5401,11 +5281,7 @@
             <a:pPr lvl="0"/>
             <a:r>
               <a:rPr lang="en-US" dirty="0" smtClean="0"/>
-              <a:t>The second screen, where the Professor is walking on the map</a:t>
-            </a:r>
-            <a:r>
-              <a:rPr lang="en-US" dirty="0" smtClean="0"/>
-              <a:t>.</a:t>
+              <a:t>The second screen, where the Professor is walking on the map.</a:t>
             </a:r>
           </a:p>
           <a:p>
@@ -5547,7 +5423,7 @@
     </p:spTree>
     <p:extLst>
       <p:ext uri="{BB962C8B-B14F-4D97-AF65-F5344CB8AC3E}">
-        <p14:creationId xmlns="" xmlns:p14="http://schemas.microsoft.com/office/powerpoint/2010/main" val="1646986932"/>
+        <p14:creationId xmlns:p14="http://schemas.microsoft.com/office/powerpoint/2010/main" xmlns="" val="1646986932"/>
       </p:ext>
     </p:extLst>
   </p:cSld>
@@ -5555,7 +5431,7 @@
     <a:masterClrMapping/>
   </p:clrMapOvr>
   <mc:AlternateContent xmlns:mc="http://schemas.openxmlformats.org/markup-compatibility/2006">
-    <mc:Choice xmlns="" xmlns:p14="http://schemas.microsoft.com/office/powerpoint/2010/main" Requires="p14">
+    <mc:Choice xmlns:p14="http://schemas.microsoft.com/office/powerpoint/2010/main" xmlns="" Requires="p14">
       <p:transition p14:dur="0"/>
     </mc:Choice>
     <mc:Fallback>
@@ -5688,7 +5564,7 @@
     </p:spTree>
     <p:extLst>
       <p:ext uri="{BB962C8B-B14F-4D97-AF65-F5344CB8AC3E}">
-        <p14:creationId xmlns="" xmlns:p14="http://schemas.microsoft.com/office/powerpoint/2010/main" val="1646986932"/>
+        <p14:creationId xmlns:p14="http://schemas.microsoft.com/office/powerpoint/2010/main" xmlns="" val="1646986932"/>
       </p:ext>
     </p:extLst>
   </p:cSld>
@@ -5696,7 +5572,7 @@
     <a:masterClrMapping/>
   </p:clrMapOvr>
   <mc:AlternateContent xmlns:mc="http://schemas.openxmlformats.org/markup-compatibility/2006">
-    <mc:Choice xmlns="" xmlns:p14="http://schemas.microsoft.com/office/powerpoint/2010/main" Requires="p14">
+    <mc:Choice xmlns:p14="http://schemas.microsoft.com/office/powerpoint/2010/main" xmlns="" Requires="p14">
       <p:transition p14:dur="0"/>
     </mc:Choice>
     <mc:Fallback>
@@ -5782,7 +5658,6 @@
               <a:rPr lang="en-US" dirty="0" smtClean="0"/>
               <a:t>The goal of this level is to increase the IQ value of the hero </a:t>
             </a:r>
-            <a:endParaRPr lang="en-US" dirty="0" smtClean="0"/>
           </a:p>
           <a:p>
             <a:pPr>
@@ -5790,15 +5665,7 @@
             </a:pPr>
             <a:r>
               <a:rPr lang="en-US" dirty="0" smtClean="0"/>
-              <a:t>up </a:t>
-            </a:r>
-            <a:r>
-              <a:rPr lang="en-US" dirty="0" smtClean="0"/>
-              <a:t>to some </a:t>
-            </a:r>
-            <a:r>
-              <a:rPr lang="en-US" dirty="0" smtClean="0"/>
-              <a:t>boundary, needed for creating of the Feynman diagrams.</a:t>
+              <a:t>up to some boundary, needed for creating of the Feynman diagrams.</a:t>
             </a:r>
             <a:endParaRPr lang="bg-BG" dirty="0" smtClean="0"/>
           </a:p>
@@ -5808,7 +5675,6 @@
               <a:rPr lang="en-US" dirty="0" smtClean="0"/>
               <a:t>During his movements on the screen </a:t>
             </a:r>
-            <a:endParaRPr lang="en-US" dirty="0" smtClean="0"/>
           </a:p>
           <a:p>
             <a:pPr lvl="0">
@@ -5816,29 +5682,8 @@
             </a:pPr>
             <a:r>
               <a:rPr lang="en-US" dirty="0" smtClean="0"/>
-              <a:t>     Professor </a:t>
-            </a:r>
-            <a:r>
-              <a:rPr lang="en-US" dirty="0" smtClean="0"/>
-              <a:t>Feynman 	</a:t>
-            </a:r>
-            <a:r>
-              <a:rPr lang="en-US" dirty="0" smtClean="0"/>
-              <a:t>	collects </a:t>
-            </a:r>
-            <a:r>
-              <a:rPr lang="en-US" dirty="0" smtClean="0"/>
-              <a:t>some </a:t>
-            </a:r>
-            <a:r>
-              <a:rPr lang="en-US" dirty="0" smtClean="0"/>
-              <a:t>pieces 	         , which </a:t>
-            </a:r>
-            <a:r>
-              <a:rPr lang="en-US" dirty="0" smtClean="0"/>
-              <a:t>help him to create </a:t>
-            </a:r>
-            <a:endParaRPr lang="en-US" dirty="0" smtClean="0"/>
+              <a:t>     Professor Feynman 		collects some pieces 	         , which help him to create </a:t>
+            </a:r>
           </a:p>
           <a:p>
             <a:pPr lvl="0"/>
@@ -5850,13 +5695,8 @@
             </a:pPr>
             <a:r>
               <a:rPr lang="en-US" dirty="0" smtClean="0"/>
-              <a:t>     his </a:t>
-            </a:r>
-            <a:r>
-              <a:rPr lang="en-US" dirty="0" smtClean="0"/>
-              <a:t>famous Feynman diagrams. </a:t>
-            </a:r>
-            <a:endParaRPr lang="en-US" dirty="0" smtClean="0"/>
+              <a:t>     his famous Feynman diagrams. </a:t>
+            </a:r>
           </a:p>
           <a:p>
             <a:pPr lvl="0">
@@ -5876,15 +5716,7 @@
             <a:pPr lvl="0"/>
             <a:r>
               <a:rPr lang="en-US" dirty="0" smtClean="0"/>
-              <a:t>In the same time some obstacles appear – some books </a:t>
-            </a:r>
-            <a:r>
-              <a:rPr lang="en-US" dirty="0" smtClean="0"/>
-              <a:t> 	or </a:t>
-            </a:r>
-            <a:r>
-              <a:rPr lang="en-US" dirty="0" smtClean="0"/>
-              <a:t>equations or diagram falls from the top part of the screen. </a:t>
+              <a:t>In the same time some obstacles appear – some books  	or equations or diagram falls from the top part of the screen. </a:t>
             </a:r>
             <a:endParaRPr lang="bg-BG" dirty="0" smtClean="0"/>
           </a:p>
@@ -5900,11 +5732,7 @@
             <a:pPr lvl="0"/>
             <a:r>
               <a:rPr lang="en-US" dirty="0" smtClean="0"/>
-              <a:t>At the end of this level, when the boundary IQ value is reached, the Professor Feynman gets a coin with Nobel face drawn on it. </a:t>
-            </a:r>
-            <a:r>
-              <a:rPr lang="en-US" dirty="0" smtClean="0"/>
-              <a:t> </a:t>
+              <a:t>At the end of this level, when the boundary IQ value is reached, the Professor Feynman gets a coin with Nobel face drawn on it.  </a:t>
             </a:r>
             <a:endParaRPr lang="bg-BG" dirty="0" smtClean="0"/>
           </a:p>
@@ -6086,7 +5914,7 @@
     </p:spTree>
     <p:extLst>
       <p:ext uri="{BB962C8B-B14F-4D97-AF65-F5344CB8AC3E}">
-        <p14:creationId xmlns="" xmlns:p14="http://schemas.microsoft.com/office/powerpoint/2010/main" val="1646986932"/>
+        <p14:creationId xmlns:p14="http://schemas.microsoft.com/office/powerpoint/2010/main" xmlns="" val="1646986932"/>
       </p:ext>
     </p:extLst>
   </p:cSld>
@@ -6094,7 +5922,7 @@
     <a:masterClrMapping/>
   </p:clrMapOvr>
   <mc:AlternateContent xmlns:mc="http://schemas.openxmlformats.org/markup-compatibility/2006">
-    <mc:Choice xmlns="" xmlns:p14="http://schemas.microsoft.com/office/powerpoint/2010/main" Requires="p14">
+    <mc:Choice xmlns:p14="http://schemas.microsoft.com/office/powerpoint/2010/main" xmlns="" Requires="p14">
       <p:transition p14:dur="0"/>
     </mc:Choice>
     <mc:Fallback>
@@ -6184,7 +6012,23 @@
                   <a:srgbClr val="FFFF00"/>
                 </a:solidFill>
               </a:rPr>
-              <a:t>This was a real teamwork project. All of us have been working actively, but in different ways</a:t>
+              <a:t>This was a real teamwork project. All of us </a:t>
+            </a:r>
+            <a:r>
+              <a:rPr lang="en-US" sz="4800" b="1" dirty="0" smtClean="0">
+                <a:solidFill>
+                  <a:srgbClr val="FFFF00"/>
+                </a:solidFill>
+              </a:rPr>
+              <a:t>have </a:t>
+            </a:r>
+            <a:r>
+              <a:rPr lang="en-US" sz="4800" b="1" dirty="0" smtClean="0">
+                <a:solidFill>
+                  <a:srgbClr val="FFFF00"/>
+                </a:solidFill>
+              </a:rPr>
+              <a:t>been working actively, but in different ways</a:t>
             </a:r>
           </a:p>
           <a:p>
@@ -6205,31 +6049,84 @@
           </a:p>
           <a:p>
             <a:r>
-              <a:rPr lang="en-US" dirty="0" err="1" smtClean="0"/>
+              <a:rPr lang="en-US" b="1" dirty="0" smtClean="0">
+                <a:solidFill>
+                  <a:schemeClr val="accent1">
+                    <a:lumMod val="75000"/>
+                  </a:schemeClr>
+                </a:solidFill>
+              </a:rPr>
+              <a:t>*</a:t>
+            </a:r>
+            <a:r>
+              <a:rPr lang="en-US" dirty="0" err="1" smtClean="0">
+                <a:solidFill>
+                  <a:schemeClr val="accent1">
+                    <a:lumMod val="75000"/>
+                  </a:schemeClr>
+                </a:solidFill>
+              </a:rPr>
               <a:t>Borislav</a:t>
             </a:r>
             <a:r>
-              <a:rPr lang="en-US" dirty="0" smtClean="0"/>
-              <a:t> </a:t>
-            </a:r>
-            <a:r>
-              <a:rPr lang="en-US" dirty="0" smtClean="0"/>
-              <a:t>– participated in Skype discussion</a:t>
-            </a:r>
-            <a:endParaRPr lang="en-US" dirty="0" smtClean="0"/>
-          </a:p>
-          <a:p>
-            <a:r>
-              <a:rPr lang="en-US" dirty="0" err="1" smtClean="0"/>
+              <a:rPr lang="en-US" dirty="0" smtClean="0">
+                <a:solidFill>
+                  <a:schemeClr val="accent1">
+                    <a:lumMod val="75000"/>
+                  </a:schemeClr>
+                </a:solidFill>
+              </a:rPr>
+              <a:t>, </a:t>
+            </a:r>
+            <a:r>
+              <a:rPr lang="en-US" dirty="0" err="1" smtClean="0">
+                <a:solidFill>
+                  <a:schemeClr val="accent1">
+                    <a:lumMod val="75000"/>
+                  </a:schemeClr>
+                </a:solidFill>
+              </a:rPr>
               <a:t>Kalina</a:t>
             </a:r>
             <a:r>
-              <a:rPr lang="en-US" dirty="0" smtClean="0"/>
-              <a:t> </a:t>
-            </a:r>
-            <a:r>
-              <a:rPr lang="en-US" dirty="0" smtClean="0"/>
-              <a:t>– participated in Skype discussion</a:t>
+              <a:rPr lang="en-US" dirty="0" smtClean="0">
+                <a:solidFill>
+                  <a:schemeClr val="accent1">
+                    <a:lumMod val="75000"/>
+                  </a:schemeClr>
+                </a:solidFill>
+              </a:rPr>
+              <a:t> – </a:t>
+            </a:r>
+            <a:r>
+              <a:rPr lang="en-US" dirty="0" smtClean="0">
+                <a:solidFill>
+                  <a:schemeClr val="accent1">
+                    <a:lumMod val="75000"/>
+                  </a:schemeClr>
+                </a:solidFill>
+              </a:rPr>
+              <a:t>participated </a:t>
+            </a:r>
+            <a:r>
+              <a:rPr lang="en-US" dirty="0" smtClean="0">
+                <a:solidFill>
+                  <a:schemeClr val="accent1">
+                    <a:lumMod val="75000"/>
+                  </a:schemeClr>
+                </a:solidFill>
+              </a:rPr>
+              <a:t> once in the Skype </a:t>
+            </a:r>
+            <a:r>
+              <a:rPr lang="en-US" dirty="0" smtClean="0">
+                <a:solidFill>
+                  <a:schemeClr val="accent1">
+                    <a:lumMod val="75000"/>
+                  </a:schemeClr>
+                </a:solidFill>
+              </a:rPr>
+              <a:t>discussion</a:t>
             </a:r>
           </a:p>
           <a:p>
@@ -6239,7 +6136,11 @@
             </a:r>
             <a:r>
               <a:rPr lang="en-US" dirty="0" smtClean="0"/>
-              <a:t> – actively participated in all discussions, main contributor to the very important and time consuming  work on editing of almost all images used in the game.</a:t>
+              <a:t> </a:t>
+            </a:r>
+            <a:r>
+              <a:rPr lang="en-US" dirty="0" smtClean="0"/>
+              <a:t>– actively participated in all discussions, main contributor to the very important and time consuming  work on editing of almost all images used in the game.</a:t>
             </a:r>
           </a:p>
           <a:p>
@@ -6249,13 +6150,8 @@
             </a:r>
             <a:r>
               <a:rPr lang="en-US" dirty="0" smtClean="0"/>
-              <a:t> </a:t>
-            </a:r>
-            <a:r>
-              <a:rPr lang="en-US" dirty="0" smtClean="0"/>
-              <a:t>– participated actively in team discussions, searching for images and other useful resources on the net, participated in describing project documentation. </a:t>
-            </a:r>
-            <a:endParaRPr lang="en-US" dirty="0" smtClean="0"/>
+              <a:t> – participated actively in team discussions, searching for images and other useful resources on the net, participated in describing project documentation. </a:t>
+            </a:r>
           </a:p>
           <a:p>
             <a:r>
@@ -6264,11 +6160,7 @@
             </a:r>
             <a:r>
               <a:rPr lang="en-US" dirty="0" smtClean="0"/>
-              <a:t>  </a:t>
-            </a:r>
-            <a:r>
-              <a:rPr lang="en-US" dirty="0" smtClean="0"/>
-              <a:t>- created the </a:t>
+              <a:t>  - created the </a:t>
             </a:r>
             <a:r>
               <a:rPr lang="en-US" dirty="0" err="1" smtClean="0"/>
@@ -6286,11 +6178,32 @@
             </a:r>
             <a:r>
               <a:rPr lang="en-US" dirty="0" smtClean="0"/>
-              <a:t>  - actively participated in team discussions and code writing. </a:t>
-            </a:r>
-            <a:endParaRPr lang="en-US" dirty="0" smtClean="0"/>
-          </a:p>
-          <a:p>
+              <a:t>  - actively participated in </a:t>
+            </a:r>
+            <a:r>
+              <a:rPr lang="en-US" dirty="0" smtClean="0"/>
+              <a:t>building </a:t>
+            </a:r>
+            <a:r>
+              <a:rPr lang="en-US" dirty="0" smtClean="0"/>
+              <a:t>the </a:t>
+            </a:r>
+            <a:r>
+              <a:rPr lang="en-US" dirty="0" err="1" smtClean="0"/>
+              <a:t>sceleton</a:t>
+            </a:r>
+            <a:r>
+              <a:rPr lang="en-US" dirty="0" smtClean="0"/>
+              <a:t> of the game </a:t>
+            </a:r>
+            <a:r>
+              <a:rPr lang="en-US" dirty="0" smtClean="0"/>
+              <a:t>code,  code writing , team </a:t>
+            </a:r>
+            <a:r>
+              <a:rPr lang="en-US" dirty="0" smtClean="0"/>
+              <a:t>discussions, etc. </a:t>
+            </a:r>
             <a:endParaRPr lang="bg-BG" dirty="0" smtClean="0"/>
           </a:p>
           <a:p>
@@ -6330,7 +6243,7 @@
     </p:spTree>
     <p:extLst>
       <p:ext uri="{BB962C8B-B14F-4D97-AF65-F5344CB8AC3E}">
-        <p14:creationId xmlns="" xmlns:p14="http://schemas.microsoft.com/office/powerpoint/2010/main" val="1646986932"/>
+        <p14:creationId xmlns:p14="http://schemas.microsoft.com/office/powerpoint/2010/main" xmlns="" val="1646986932"/>
       </p:ext>
     </p:extLst>
   </p:cSld>
@@ -6338,7 +6251,7 @@
     <a:masterClrMapping/>
   </p:clrMapOvr>
   <mc:AlternateContent xmlns:mc="http://schemas.openxmlformats.org/markup-compatibility/2006">
-    <mc:Choice xmlns="" xmlns:p14="http://schemas.microsoft.com/office/powerpoint/2010/main" Requires="p14">
+    <mc:Choice xmlns:p14="http://schemas.microsoft.com/office/powerpoint/2010/main" xmlns="" Requires="p14">
       <p:transition p14:dur="0"/>
     </mc:Choice>
     <mc:Fallback>

</xml_diff>

<commit_message>
Added screen3 in the Presentation/Team_Feynman_Game_Presentation.pptx. Small changes in the last slide concerning team members contributions
</commit_message>
<xml_diff>
--- a/Presentation/Team_Feynman_Game_Presentation.pptx
+++ b/Presentation/Team_Feynman_Game_Presentation.pptx
@@ -5413,6 +5413,32 @@
           <a:xfrm>
             <a:off x="723853" y="2743200"/>
             <a:ext cx="2712699" cy="1905000"/>
+          </a:xfrm>
+          <a:prstGeom prst="rect">
+            <a:avLst/>
+          </a:prstGeom>
+          <a:noFill/>
+        </p:spPr>
+      </p:pic>
+      <p:pic>
+        <p:nvPicPr>
+          <p:cNvPr id="1026" name="Picture 2" descr="I:\Neli\C_Sharp_kurs_2\igra0\IgraTemp\The-Game\Screens\ThirdScreen.png"/>
+          <p:cNvPicPr>
+            <a:picLocks noChangeAspect="1" noChangeArrowheads="1"/>
+          </p:cNvPicPr>
+          <p:nvPr/>
+        </p:nvPicPr>
+        <p:blipFill>
+          <a:blip r:embed="rId5" cstate="print"/>
+          <a:srcRect/>
+          <a:stretch>
+            <a:fillRect/>
+          </a:stretch>
+        </p:blipFill>
+        <p:spPr bwMode="auto">
+          <a:xfrm>
+            <a:off x="6475412" y="2743200"/>
+            <a:ext cx="2743200" cy="1905000"/>
           </a:xfrm>
           <a:prstGeom prst="rect">
             <a:avLst/>

</xml_diff>

<commit_message>
The final version of Presentation/Team_Feynman_Game_Presentation.pptx
</commit_message>
<xml_diff>
--- a/Presentation/Team_Feynman_Game_Presentation.pptx
+++ b/Presentation/Team_Feynman_Game_Presentation.pptx
@@ -17,9 +17,9 @@
     <p:sldId id="357" r:id="rId6"/>
     <p:sldId id="356" r:id="rId7"/>
     <p:sldId id="363" r:id="rId8"/>
-    <p:sldId id="362" r:id="rId9"/>
-    <p:sldId id="361" r:id="rId10"/>
-    <p:sldId id="360" r:id="rId11"/>
+    <p:sldId id="361" r:id="rId9"/>
+    <p:sldId id="360" r:id="rId10"/>
+    <p:sldId id="365" r:id="rId11"/>
   </p:sldIdLst>
   <p:sldSz cx="12188825" cy="6858000"/>
   <p:notesSz cx="6858000" cy="9144000"/>
@@ -120,7 +120,7 @@
   </p:defaultTextStyle>
   <p:extLst>
     <p:ext uri="{EFAFB233-063F-42B5-8137-9DF3F51BA10A}">
-      <p15:sldGuideLst xmlns:p15="http://schemas.microsoft.com/office/powerpoint/2012/main" xmlns="">
+      <p15:sldGuideLst xmlns="" xmlns:p15="http://schemas.microsoft.com/office/powerpoint/2012/main">
         <p15:guide id="1" orient="horz" pos="2160" userDrawn="1">
           <p15:clr>
             <a:srgbClr val="A4A3A4"/>
@@ -134,7 +134,7 @@
       </p15:sldGuideLst>
     </p:ext>
     <p:ext uri="{2D200454-40CA-4A62-9FC3-DE9A4176ACB9}">
-      <p15:notesGuideLst xmlns:p15="http://schemas.microsoft.com/office/powerpoint/2012/main" xmlns="">
+      <p15:notesGuideLst xmlns="" xmlns:p15="http://schemas.microsoft.com/office/powerpoint/2012/main">
         <p15:guide id="1" orient="horz" pos="2880">
           <p15:clr>
             <a:srgbClr val="A4A3A4"/>
@@ -341,7 +341,7 @@
     </p:spTree>
     <p:extLst>
       <p:ext uri="{BB962C8B-B14F-4D97-AF65-F5344CB8AC3E}">
-        <p14:creationId xmlns:p14="http://schemas.microsoft.com/office/powerpoint/2010/main" xmlns="" val="4232045756"/>
+        <p14:creationId xmlns="" xmlns:p14="http://schemas.microsoft.com/office/powerpoint/2010/main" val="4232045756"/>
       </p:ext>
     </p:extLst>
   </p:cSld>
@@ -632,7 +632,7 @@
     </p:spTree>
     <p:extLst>
       <p:ext uri="{BB962C8B-B14F-4D97-AF65-F5344CB8AC3E}">
-        <p14:creationId xmlns:p14="http://schemas.microsoft.com/office/powerpoint/2010/main" xmlns="" val="276705785"/>
+        <p14:creationId xmlns="" xmlns:p14="http://schemas.microsoft.com/office/powerpoint/2010/main" val="276705785"/>
       </p:ext>
     </p:extLst>
   </p:cSld>
@@ -858,7 +858,7 @@
     </p:spTree>
     <p:extLst>
       <p:ext uri="{BB962C8B-B14F-4D97-AF65-F5344CB8AC3E}">
-        <p14:creationId xmlns:p14="http://schemas.microsoft.com/office/powerpoint/2010/main" xmlns="" val="914151531"/>
+        <p14:creationId xmlns="" xmlns:p14="http://schemas.microsoft.com/office/powerpoint/2010/main" val="914151531"/>
       </p:ext>
     </p:extLst>
   </p:cSld>
@@ -995,7 +995,7 @@
     </p:spTree>
     <p:extLst>
       <p:ext uri="{BB962C8B-B14F-4D97-AF65-F5344CB8AC3E}">
-        <p14:creationId xmlns:p14="http://schemas.microsoft.com/office/powerpoint/2010/main" xmlns="" val="1134749778"/>
+        <p14:creationId xmlns="" xmlns:p14="http://schemas.microsoft.com/office/powerpoint/2010/main" val="1134749778"/>
       </p:ext>
     </p:extLst>
   </p:cSld>
@@ -1132,7 +1132,7 @@
     </p:spTree>
     <p:extLst>
       <p:ext uri="{BB962C8B-B14F-4D97-AF65-F5344CB8AC3E}">
-        <p14:creationId xmlns:p14="http://schemas.microsoft.com/office/powerpoint/2010/main" xmlns="" val="1134749778"/>
+        <p14:creationId xmlns="" xmlns:p14="http://schemas.microsoft.com/office/powerpoint/2010/main" val="1134749778"/>
       </p:ext>
     </p:extLst>
   </p:cSld>
@@ -1269,7 +1269,7 @@
     </p:spTree>
     <p:extLst>
       <p:ext uri="{BB962C8B-B14F-4D97-AF65-F5344CB8AC3E}">
-        <p14:creationId xmlns:p14="http://schemas.microsoft.com/office/powerpoint/2010/main" xmlns="" val="1134749778"/>
+        <p14:creationId xmlns="" xmlns:p14="http://schemas.microsoft.com/office/powerpoint/2010/main" val="1134749778"/>
       </p:ext>
     </p:extLst>
   </p:cSld>
@@ -1406,7 +1406,7 @@
     </p:spTree>
     <p:extLst>
       <p:ext uri="{BB962C8B-B14F-4D97-AF65-F5344CB8AC3E}">
-        <p14:creationId xmlns:p14="http://schemas.microsoft.com/office/powerpoint/2010/main" xmlns="" val="1134749778"/>
+        <p14:creationId xmlns="" xmlns:p14="http://schemas.microsoft.com/office/powerpoint/2010/main" val="1134749778"/>
       </p:ext>
     </p:extLst>
   </p:cSld>
@@ -1543,7 +1543,7 @@
     </p:spTree>
     <p:extLst>
       <p:ext uri="{BB962C8B-B14F-4D97-AF65-F5344CB8AC3E}">
-        <p14:creationId xmlns:p14="http://schemas.microsoft.com/office/powerpoint/2010/main" xmlns="" val="1134749778"/>
+        <p14:creationId xmlns="" xmlns:p14="http://schemas.microsoft.com/office/powerpoint/2010/main" val="1134749778"/>
       </p:ext>
     </p:extLst>
   </p:cSld>
@@ -1680,7 +1680,7 @@
     </p:spTree>
     <p:extLst>
       <p:ext uri="{BB962C8B-B14F-4D97-AF65-F5344CB8AC3E}">
-        <p14:creationId xmlns:p14="http://schemas.microsoft.com/office/powerpoint/2010/main" xmlns="" val="1134749778"/>
+        <p14:creationId xmlns="" xmlns:p14="http://schemas.microsoft.com/office/powerpoint/2010/main" val="1134749778"/>
       </p:ext>
     </p:extLst>
   </p:cSld>
@@ -1817,7 +1817,7 @@
     </p:spTree>
     <p:extLst>
       <p:ext uri="{BB962C8B-B14F-4D97-AF65-F5344CB8AC3E}">
-        <p14:creationId xmlns:p14="http://schemas.microsoft.com/office/powerpoint/2010/main" xmlns="" val="1134749778"/>
+        <p14:creationId xmlns="" xmlns:p14="http://schemas.microsoft.com/office/powerpoint/2010/main" val="1134749778"/>
       </p:ext>
     </p:extLst>
   </p:cSld>
@@ -1954,7 +1954,7 @@
     </p:spTree>
     <p:extLst>
       <p:ext uri="{BB962C8B-B14F-4D97-AF65-F5344CB8AC3E}">
-        <p14:creationId xmlns:p14="http://schemas.microsoft.com/office/powerpoint/2010/main" xmlns="" val="1134749778"/>
+        <p14:creationId xmlns="" xmlns:p14="http://schemas.microsoft.com/office/powerpoint/2010/main" val="1134749778"/>
       </p:ext>
     </p:extLst>
   </p:cSld>
@@ -2458,7 +2458,7 @@
     </p:spTree>
     <p:extLst>
       <p:ext uri="{BB962C8B-B14F-4D97-AF65-F5344CB8AC3E}">
-        <p14:creationId xmlns:p14="http://schemas.microsoft.com/office/powerpoint/2010/main" xmlns="" val="1847488592"/>
+        <p14:creationId xmlns="" xmlns:p14="http://schemas.microsoft.com/office/powerpoint/2010/main" val="1847488592"/>
       </p:ext>
     </p:extLst>
   </p:cSld>
@@ -2466,7 +2466,7 @@
     <a:masterClrMapping/>
   </p:clrMapOvr>
   <mc:AlternateContent xmlns:mc="http://schemas.openxmlformats.org/markup-compatibility/2006">
-    <mc:Choice xmlns:p14="http://schemas.microsoft.com/office/powerpoint/2010/main" xmlns="" Requires="p14">
+    <mc:Choice xmlns="" xmlns:p14="http://schemas.microsoft.com/office/powerpoint/2010/main" Requires="p14">
       <p:transition p14:dur="0"/>
     </mc:Choice>
     <mc:Fallback>
@@ -2772,7 +2772,7 @@
     </p:spTree>
     <p:extLst>
       <p:ext uri="{BB962C8B-B14F-4D97-AF65-F5344CB8AC3E}">
-        <p14:creationId xmlns:p14="http://schemas.microsoft.com/office/powerpoint/2010/main" xmlns="" val="1406769010"/>
+        <p14:creationId xmlns="" xmlns:p14="http://schemas.microsoft.com/office/powerpoint/2010/main" val="1406769010"/>
       </p:ext>
     </p:extLst>
   </p:cSld>
@@ -2780,7 +2780,7 @@
     <a:masterClrMapping/>
   </p:clrMapOvr>
   <mc:AlternateContent xmlns:mc="http://schemas.openxmlformats.org/markup-compatibility/2006">
-    <mc:Choice xmlns:p14="http://schemas.microsoft.com/office/powerpoint/2010/main" xmlns="" Requires="p14">
+    <mc:Choice xmlns="" xmlns:p14="http://schemas.microsoft.com/office/powerpoint/2010/main" Requires="p14">
       <p:transition p14:dur="0"/>
     </mc:Choice>
     <mc:Fallback>
@@ -2999,7 +2999,7 @@
     </p:spTree>
     <p:extLst>
       <p:ext uri="{BB962C8B-B14F-4D97-AF65-F5344CB8AC3E}">
-        <p14:creationId xmlns:p14="http://schemas.microsoft.com/office/powerpoint/2010/main" xmlns="" val="3616330612"/>
+        <p14:creationId xmlns="" xmlns:p14="http://schemas.microsoft.com/office/powerpoint/2010/main" val="3616330612"/>
       </p:ext>
     </p:extLst>
   </p:cSld>
@@ -3007,7 +3007,7 @@
     <a:masterClrMapping/>
   </p:clrMapOvr>
   <mc:AlternateContent xmlns:mc="http://schemas.openxmlformats.org/markup-compatibility/2006">
-    <mc:Choice xmlns:p14="http://schemas.microsoft.com/office/powerpoint/2010/main" xmlns="" Requires="p14">
+    <mc:Choice xmlns="" xmlns:p14="http://schemas.microsoft.com/office/powerpoint/2010/main" Requires="p14">
       <p:transition p14:dur="0"/>
     </mc:Choice>
     <mc:Fallback>
@@ -3044,7 +3044,7 @@
     </p:spTree>
     <p:extLst>
       <p:ext uri="{BB962C8B-B14F-4D97-AF65-F5344CB8AC3E}">
-        <p14:creationId xmlns:p14="http://schemas.microsoft.com/office/powerpoint/2010/main" xmlns="" val="2172478503"/>
+        <p14:creationId xmlns="" xmlns:p14="http://schemas.microsoft.com/office/powerpoint/2010/main" val="2172478503"/>
       </p:ext>
     </p:extLst>
   </p:cSld>
@@ -3052,7 +3052,7 @@
     <a:masterClrMapping/>
   </p:clrMapOvr>
   <mc:AlternateContent xmlns:mc="http://schemas.openxmlformats.org/markup-compatibility/2006">
-    <mc:Choice xmlns:p14="http://schemas.microsoft.com/office/powerpoint/2010/main" xmlns="" Requires="p14">
+    <mc:Choice xmlns="" xmlns:p14="http://schemas.microsoft.com/office/powerpoint/2010/main" Requires="p14">
       <p:transition p14:dur="0"/>
     </mc:Choice>
     <mc:Fallback>
@@ -3319,7 +3319,7 @@
     </p:spTree>
     <p:extLst>
       <p:ext uri="{BB962C8B-B14F-4D97-AF65-F5344CB8AC3E}">
-        <p14:creationId xmlns:p14="http://schemas.microsoft.com/office/powerpoint/2010/main" xmlns="" val="1395275884"/>
+        <p14:creationId xmlns="" xmlns:p14="http://schemas.microsoft.com/office/powerpoint/2010/main" val="1395275884"/>
       </p:ext>
     </p:extLst>
   </p:cSld>
@@ -3331,7 +3331,7 @@
     <p:sldLayoutId id="2147483667" r:id="rId4"/>
   </p:sldLayoutIdLst>
   <mc:AlternateContent xmlns:mc="http://schemas.openxmlformats.org/markup-compatibility/2006">
-    <mc:Choice xmlns:p14="http://schemas.microsoft.com/office/powerpoint/2010/main" xmlns="" Requires="p14">
+    <mc:Choice xmlns="" xmlns:p14="http://schemas.microsoft.com/office/powerpoint/2010/main" Requires="p14">
       <p:transition p14:dur="0"/>
     </mc:Choice>
     <mc:Fallback>
@@ -3679,7 +3679,7 @@
   </p:txStyles>
   <p:extLst mod="1">
     <p:ext uri="{27BBF7A9-308A-43DC-89C8-2F10F3537804}">
-      <p15:sldGuideLst xmlns:p15="http://schemas.microsoft.com/office/powerpoint/2012/main" xmlns="">
+      <p15:sldGuideLst xmlns="" xmlns:p15="http://schemas.microsoft.com/office/powerpoint/2012/main">
         <p15:guide id="1" orient="horz" pos="2160" userDrawn="1">
           <p15:clr>
             <a:srgbClr val="F26B43"/>
@@ -3912,7 +3912,7 @@
     </p:spTree>
     <p:extLst>
       <p:ext uri="{BB962C8B-B14F-4D97-AF65-F5344CB8AC3E}">
-        <p14:creationId xmlns:p14="http://schemas.microsoft.com/office/powerpoint/2010/main" xmlns="" val="3215379390"/>
+        <p14:creationId xmlns="" xmlns:p14="http://schemas.microsoft.com/office/powerpoint/2010/main" val="3215379390"/>
       </p:ext>
     </p:extLst>
   </p:cSld>
@@ -3920,7 +3920,7 @@
     <a:masterClrMapping/>
   </p:clrMapOvr>
   <mc:AlternateContent xmlns:mc="http://schemas.openxmlformats.org/markup-compatibility/2006">
-    <mc:Choice xmlns:p14="http://schemas.microsoft.com/office/powerpoint/2010/main" xmlns="" Requires="p14">
+    <mc:Choice xmlns="" xmlns:p14="http://schemas.microsoft.com/office/powerpoint/2010/main" Requires="p14">
       <p:transition p14:dur="0"/>
     </mc:Choice>
     <mc:Fallback>
@@ -4055,14 +4055,13 @@
           <a:p>
             <a:r>
               <a:rPr lang="en-US" dirty="0" smtClean="0"/>
-              <a:t>What is realized till now</a:t>
-            </a:r>
-          </a:p>
-          <a:p>
-            <a:r>
-              <a:rPr lang="en-US" dirty="0" smtClean="0"/>
-              <a:t>Code examples</a:t>
-            </a:r>
+              <a:t>What is realized till </a:t>
+            </a:r>
+            <a:r>
+              <a:rPr lang="en-US" dirty="0" smtClean="0"/>
+              <a:t>now</a:t>
+            </a:r>
+            <a:endParaRPr lang="en-US" dirty="0" smtClean="0"/>
           </a:p>
           <a:p>
             <a:r>
@@ -4073,8 +4072,19 @@
           <a:p>
             <a:r>
               <a:rPr lang="en-US" dirty="0" smtClean="0"/>
-              <a:t>How we have worked</a:t>
-            </a:r>
+              <a:t>How we have </a:t>
+            </a:r>
+            <a:r>
+              <a:rPr lang="en-US" dirty="0" smtClean="0"/>
+              <a:t>worked</a:t>
+            </a:r>
+          </a:p>
+          <a:p>
+            <a:r>
+              <a:rPr lang="en-US" dirty="0" smtClean="0"/>
+              <a:t>Live Demo of the game </a:t>
+            </a:r>
+            <a:endParaRPr lang="en-US" dirty="0" smtClean="0"/>
           </a:p>
           <a:p>
             <a:endParaRPr lang="en-US" dirty="0" smtClean="0"/>
@@ -4141,7 +4151,7 @@
     </p:spTree>
     <p:extLst>
       <p:ext uri="{BB962C8B-B14F-4D97-AF65-F5344CB8AC3E}">
-        <p14:creationId xmlns:p14="http://schemas.microsoft.com/office/powerpoint/2010/main" xmlns="" val="1646986932"/>
+        <p14:creationId xmlns="" xmlns:p14="http://schemas.microsoft.com/office/powerpoint/2010/main" val="1646986932"/>
       </p:ext>
     </p:extLst>
   </p:cSld>
@@ -4149,7 +4159,7 @@
     <a:masterClrMapping/>
   </p:clrMapOvr>
   <mc:AlternateContent xmlns:mc="http://schemas.openxmlformats.org/markup-compatibility/2006">
-    <mc:Choice xmlns:p14="http://schemas.microsoft.com/office/powerpoint/2010/main" xmlns="" Requires="p14">
+    <mc:Choice xmlns="" xmlns:p14="http://schemas.microsoft.com/office/powerpoint/2010/main" Requires="p14">
       <p:transition p14:dur="0"/>
     </mc:Choice>
     <mc:Fallback>
@@ -4315,7 +4325,7 @@
     </p:spTree>
     <p:extLst>
       <p:ext uri="{BB962C8B-B14F-4D97-AF65-F5344CB8AC3E}">
-        <p14:creationId xmlns:p14="http://schemas.microsoft.com/office/powerpoint/2010/main" xmlns="" val="1646986932"/>
+        <p14:creationId xmlns="" xmlns:p14="http://schemas.microsoft.com/office/powerpoint/2010/main" val="1646986932"/>
       </p:ext>
     </p:extLst>
   </p:cSld>
@@ -4323,7 +4333,7 @@
     <a:masterClrMapping/>
   </p:clrMapOvr>
   <mc:AlternateContent xmlns:mc="http://schemas.openxmlformats.org/markup-compatibility/2006">
-    <mc:Choice xmlns:p14="http://schemas.microsoft.com/office/powerpoint/2010/main" xmlns="" Requires="p14">
+    <mc:Choice xmlns="" xmlns:p14="http://schemas.microsoft.com/office/powerpoint/2010/main" Requires="p14">
       <p:transition p14:dur="0"/>
     </mc:Choice>
     <mc:Fallback>
@@ -4967,7 +4977,7 @@
     </p:spTree>
     <p:extLst>
       <p:ext uri="{BB962C8B-B14F-4D97-AF65-F5344CB8AC3E}">
-        <p14:creationId xmlns:p14="http://schemas.microsoft.com/office/powerpoint/2010/main" xmlns="" val="1646986932"/>
+        <p14:creationId xmlns="" xmlns:p14="http://schemas.microsoft.com/office/powerpoint/2010/main" val="1646986932"/>
       </p:ext>
     </p:extLst>
   </p:cSld>
@@ -4975,7 +4985,7 @@
     <a:masterClrMapping/>
   </p:clrMapOvr>
   <mc:AlternateContent xmlns:mc="http://schemas.openxmlformats.org/markup-compatibility/2006">
-    <mc:Choice xmlns:p14="http://schemas.microsoft.com/office/powerpoint/2010/main" xmlns="" Requires="p14">
+    <mc:Choice xmlns="" xmlns:p14="http://schemas.microsoft.com/office/powerpoint/2010/main" Requires="p14">
       <p:transition p14:dur="0"/>
     </mc:Choice>
     <mc:Fallback>
@@ -5181,7 +5191,7 @@
     </p:spTree>
     <p:extLst>
       <p:ext uri="{BB962C8B-B14F-4D97-AF65-F5344CB8AC3E}">
-        <p14:creationId xmlns:p14="http://schemas.microsoft.com/office/powerpoint/2010/main" xmlns="" val="1646986932"/>
+        <p14:creationId xmlns="" xmlns:p14="http://schemas.microsoft.com/office/powerpoint/2010/main" val="1646986932"/>
       </p:ext>
     </p:extLst>
   </p:cSld>
@@ -5189,7 +5199,7 @@
     <a:masterClrMapping/>
   </p:clrMapOvr>
   <mc:AlternateContent xmlns:mc="http://schemas.openxmlformats.org/markup-compatibility/2006">
-    <mc:Choice xmlns:p14="http://schemas.microsoft.com/office/powerpoint/2010/main" xmlns="" Requires="p14">
+    <mc:Choice xmlns="" xmlns:p14="http://schemas.microsoft.com/office/powerpoint/2010/main" Requires="p14">
       <p:transition p14:dur="0"/>
     </mc:Choice>
     <mc:Fallback>
@@ -5449,7 +5459,7 @@
     </p:spTree>
     <p:extLst>
       <p:ext uri="{BB962C8B-B14F-4D97-AF65-F5344CB8AC3E}">
-        <p14:creationId xmlns:p14="http://schemas.microsoft.com/office/powerpoint/2010/main" xmlns="" val="1646986932"/>
+        <p14:creationId xmlns="" xmlns:p14="http://schemas.microsoft.com/office/powerpoint/2010/main" val="1646986932"/>
       </p:ext>
     </p:extLst>
   </p:cSld>
@@ -5457,7 +5467,7 @@
     <a:masterClrMapping/>
   </p:clrMapOvr>
   <mc:AlternateContent xmlns:mc="http://schemas.openxmlformats.org/markup-compatibility/2006">
-    <mc:Choice xmlns:p14="http://schemas.microsoft.com/office/powerpoint/2010/main" xmlns="" Requires="p14">
+    <mc:Choice xmlns="" xmlns:p14="http://schemas.microsoft.com/office/powerpoint/2010/main" Requires="p14">
       <p:transition p14:dur="0"/>
     </mc:Choice>
     <mc:Fallback>
@@ -5510,7 +5520,7 @@
           <a:p>
             <a:r>
               <a:rPr lang="en-US" dirty="0" smtClean="0"/>
-              <a:t>Code examples</a:t>
+              <a:t>Future work</a:t>
             </a:r>
             <a:endParaRPr lang="bg-BG" dirty="0"/>
           </a:p>
@@ -5528,19 +5538,159 @@
         </p:nvSpPr>
         <p:spPr>
           <a:xfrm>
-            <a:off x="190413" y="1191467"/>
-            <a:ext cx="11804822" cy="5530010"/>
+            <a:off x="227012" y="1066800"/>
+            <a:ext cx="11804822" cy="5959477"/>
           </a:xfrm>
         </p:spPr>
         <p:txBody>
           <a:bodyPr>
-            <a:normAutofit/>
+            <a:normAutofit fontScale="62500" lnSpcReduction="20000"/>
           </a:bodyPr>
           <a:lstStyle/>
           <a:p>
-            <a:r>
-              <a:rPr lang="en-US" dirty="0" smtClean="0"/>
-              <a:t>Game1.cs </a:t>
+            <a:pPr lvl="0"/>
+            <a:r>
+              <a:rPr lang="en-US" dirty="0" smtClean="0"/>
+              <a:t>The goal of this level is </a:t>
+            </a:r>
+            <a:r>
+              <a:rPr lang="en-US" b="1" dirty="0" smtClean="0">
+                <a:solidFill>
+                  <a:srgbClr val="FFFF00"/>
+                </a:solidFill>
+              </a:rPr>
+              <a:t>to increase the IQ value </a:t>
+            </a:r>
+            <a:r>
+              <a:rPr lang="en-US" dirty="0" smtClean="0"/>
+              <a:t>of the hero </a:t>
+            </a:r>
+            <a:r>
+              <a:rPr lang="en-US" dirty="0" smtClean="0"/>
+              <a:t> up </a:t>
+            </a:r>
+            <a:r>
+              <a:rPr lang="en-US" dirty="0" smtClean="0"/>
+              <a:t>to some boundary, needed for creating of the Feynman diagrams.</a:t>
+            </a:r>
+            <a:endParaRPr lang="bg-BG" dirty="0" smtClean="0"/>
+          </a:p>
+          <a:p>
+            <a:pPr lvl="0"/>
+            <a:r>
+              <a:rPr lang="en-US" dirty="0" smtClean="0"/>
+              <a:t>During his movements on the screen </a:t>
+            </a:r>
+          </a:p>
+          <a:p>
+            <a:pPr lvl="0">
+              <a:buNone/>
+            </a:pPr>
+            <a:r>
+              <a:rPr lang="en-US" dirty="0" smtClean="0"/>
+              <a:t>     Professor Feynman 		</a:t>
+            </a:r>
+            <a:r>
+              <a:rPr lang="en-US" b="1" dirty="0" smtClean="0">
+                <a:solidFill>
+                  <a:srgbClr val="FFFF00"/>
+                </a:solidFill>
+              </a:rPr>
+              <a:t>collects some pieces </a:t>
+            </a:r>
+            <a:r>
+              <a:rPr lang="en-US" dirty="0" smtClean="0"/>
+              <a:t>	         , which help him to create </a:t>
+            </a:r>
+          </a:p>
+          <a:p>
+            <a:pPr lvl="0"/>
+            <a:endParaRPr lang="en-US" dirty="0" smtClean="0"/>
+          </a:p>
+          <a:p>
+            <a:pPr lvl="0">
+              <a:buNone/>
+            </a:pPr>
+            <a:r>
+              <a:rPr lang="en-US" dirty="0" smtClean="0"/>
+              <a:t>     his famous Feynman diagrams. </a:t>
+            </a:r>
+          </a:p>
+          <a:p>
+            <a:pPr lvl="0">
+              <a:buNone/>
+            </a:pPr>
+            <a:endParaRPr lang="bg-BG" dirty="0" smtClean="0"/>
+          </a:p>
+          <a:p>
+            <a:pPr lvl="0"/>
+            <a:r>
+              <a:rPr lang="en-US" dirty="0" smtClean="0"/>
+              <a:t>Once he manages to collect something, his IQ value arises. </a:t>
+            </a:r>
+            <a:endParaRPr lang="bg-BG" dirty="0" smtClean="0"/>
+          </a:p>
+          <a:p>
+            <a:pPr lvl="0"/>
+            <a:r>
+              <a:rPr lang="en-US" dirty="0" smtClean="0"/>
+              <a:t>In the same time </a:t>
+            </a:r>
+            <a:r>
+              <a:rPr lang="en-US" b="1" dirty="0" smtClean="0">
+                <a:solidFill>
+                  <a:srgbClr val="FFFF00"/>
+                </a:solidFill>
+              </a:rPr>
+              <a:t>some obstacles</a:t>
+            </a:r>
+            <a:r>
+              <a:rPr lang="en-US" dirty="0" smtClean="0"/>
+              <a:t> appear – some books  	or equations or diagram falls from the top part of the screen. </a:t>
+            </a:r>
+            <a:endParaRPr lang="bg-BG" dirty="0" smtClean="0"/>
+          </a:p>
+          <a:p>
+            <a:pPr lvl="0"/>
+            <a:r>
+              <a:rPr lang="en-US" dirty="0" smtClean="0"/>
+              <a:t>Ones the Professor meets these obstacles, his IQ decreases with certain value. </a:t>
+            </a:r>
+            <a:endParaRPr lang="bg-BG" dirty="0" smtClean="0"/>
+          </a:p>
+          <a:p>
+            <a:pPr lvl="0"/>
+            <a:r>
+              <a:rPr lang="en-US" dirty="0" smtClean="0">
+                <a:solidFill>
+                  <a:srgbClr val="FFFF00"/>
+                </a:solidFill>
+              </a:rPr>
+              <a:t>At the end </a:t>
+            </a:r>
+            <a:r>
+              <a:rPr lang="en-US" dirty="0" smtClean="0"/>
+              <a:t>of this level, when the boundary IQ value is reached, the Professor Feynman </a:t>
+            </a:r>
+            <a:r>
+              <a:rPr lang="en-US" b="1" dirty="0" smtClean="0">
+                <a:solidFill>
+                  <a:srgbClr val="FFFF00"/>
+                </a:solidFill>
+              </a:rPr>
+              <a:t>gets a coin </a:t>
+            </a:r>
+            <a:r>
+              <a:rPr lang="en-US" dirty="0" smtClean="0"/>
+              <a:t>with Nobel face drawn on it.  </a:t>
+            </a:r>
+            <a:endParaRPr lang="bg-BG" dirty="0" smtClean="0"/>
+          </a:p>
+          <a:p>
+            <a:pPr lvl="0"/>
+            <a:r>
+              <a:rPr lang="en-US" dirty="0" smtClean="0"/>
+              <a:t>During all the time a suitable music for all events is playing. </a:t>
             </a:r>
             <a:endParaRPr lang="bg-BG" dirty="0" smtClean="0"/>
           </a:p>
@@ -5582,232 +5732,6 @@
               <a:rPr lang="en-US" smtClean="0"/>
               <a:pPr/>
               <a:t>7</a:t>
-            </a:fld>
-            <a:endParaRPr lang="en-US" dirty="0"/>
-          </a:p>
-        </p:txBody>
-      </p:sp>
-    </p:spTree>
-    <p:extLst>
-      <p:ext uri="{BB962C8B-B14F-4D97-AF65-F5344CB8AC3E}">
-        <p14:creationId xmlns:p14="http://schemas.microsoft.com/office/powerpoint/2010/main" xmlns="" val="1646986932"/>
-      </p:ext>
-    </p:extLst>
-  </p:cSld>
-  <p:clrMapOvr>
-    <a:masterClrMapping/>
-  </p:clrMapOvr>
-  <mc:AlternateContent xmlns:mc="http://schemas.openxmlformats.org/markup-compatibility/2006">
-    <mc:Choice xmlns:p14="http://schemas.microsoft.com/office/powerpoint/2010/main" xmlns="" Requires="p14">
-      <p:transition p14:dur="0"/>
-    </mc:Choice>
-    <mc:Fallback>
-      <p:transition/>
-    </mc:Fallback>
-  </mc:AlternateContent>
-  <p:timing>
-    <p:tnLst>
-      <p:par>
-        <p:cTn id="1" dur="indefinite" restart="never" nodeType="tmRoot"/>
-      </p:par>
-    </p:tnLst>
-  </p:timing>
-</p:sld>
-</file>
-
-<file path=ppt/slides/slide8.xml><?xml version="1.0" encoding="utf-8"?>
-<p:sld xmlns:a="http://schemas.openxmlformats.org/drawingml/2006/main" xmlns:r="http://schemas.openxmlformats.org/officeDocument/2006/relationships" xmlns:p="http://schemas.openxmlformats.org/presentationml/2006/main" showMasterSp="0">
-  <p:cSld>
-    <p:spTree>
-      <p:nvGrpSpPr>
-        <p:cNvPr id="1" name=""/>
-        <p:cNvGrpSpPr/>
-        <p:nvPr/>
-      </p:nvGrpSpPr>
-      <p:grpSpPr>
-        <a:xfrm>
-          <a:off x="0" y="0"/>
-          <a:ext cx="0" cy="0"/>
-          <a:chOff x="0" y="0"/>
-          <a:chExt cx="0" cy="0"/>
-        </a:xfrm>
-      </p:grpSpPr>
-      <p:sp>
-        <p:nvSpPr>
-          <p:cNvPr id="444418" name="Rectangle 2"/>
-          <p:cNvSpPr>
-            <a:spLocks noGrp="1" noChangeArrowheads="1"/>
-          </p:cNvSpPr>
-          <p:nvPr>
-            <p:ph type="title"/>
-          </p:nvPr>
-        </p:nvSpPr>
-        <p:spPr/>
-        <p:txBody>
-          <a:bodyPr>
-            <a:normAutofit/>
-          </a:bodyPr>
-          <a:lstStyle/>
-          <a:p>
-            <a:r>
-              <a:rPr lang="en-US" dirty="0" smtClean="0"/>
-              <a:t>Future work</a:t>
-            </a:r>
-            <a:endParaRPr lang="bg-BG" dirty="0"/>
-          </a:p>
-        </p:txBody>
-      </p:sp>
-      <p:sp>
-        <p:nvSpPr>
-          <p:cNvPr id="444419" name="Rectangle 3"/>
-          <p:cNvSpPr>
-            <a:spLocks noGrp="1" noChangeArrowheads="1"/>
-          </p:cNvSpPr>
-          <p:nvPr>
-            <p:ph idx="4294967295"/>
-          </p:nvPr>
-        </p:nvSpPr>
-        <p:spPr>
-          <a:xfrm>
-            <a:off x="190413" y="762000"/>
-            <a:ext cx="11804822" cy="5959477"/>
-          </a:xfrm>
-        </p:spPr>
-        <p:txBody>
-          <a:bodyPr>
-            <a:normAutofit fontScale="62500" lnSpcReduction="20000"/>
-          </a:bodyPr>
-          <a:lstStyle/>
-          <a:p>
-            <a:pPr lvl="0"/>
-            <a:r>
-              <a:rPr lang="en-US" dirty="0" smtClean="0"/>
-              <a:t>The goal of this level is to increase the IQ value of the hero </a:t>
-            </a:r>
-          </a:p>
-          <a:p>
-            <a:pPr>
-              <a:buNone/>
-            </a:pPr>
-            <a:r>
-              <a:rPr lang="en-US" dirty="0" smtClean="0"/>
-              <a:t>up to some boundary, needed for creating of the Feynman diagrams.</a:t>
-            </a:r>
-            <a:endParaRPr lang="bg-BG" dirty="0" smtClean="0"/>
-          </a:p>
-          <a:p>
-            <a:pPr lvl="0"/>
-            <a:r>
-              <a:rPr lang="en-US" dirty="0" smtClean="0"/>
-              <a:t>During his movements on the screen </a:t>
-            </a:r>
-          </a:p>
-          <a:p>
-            <a:pPr lvl="0">
-              <a:buNone/>
-            </a:pPr>
-            <a:r>
-              <a:rPr lang="en-US" dirty="0" smtClean="0"/>
-              <a:t>     Professor Feynman 		collects some pieces 	         , which help him to create </a:t>
-            </a:r>
-          </a:p>
-          <a:p>
-            <a:pPr lvl="0"/>
-            <a:endParaRPr lang="en-US" dirty="0" smtClean="0"/>
-          </a:p>
-          <a:p>
-            <a:pPr lvl="0">
-              <a:buNone/>
-            </a:pPr>
-            <a:r>
-              <a:rPr lang="en-US" dirty="0" smtClean="0"/>
-              <a:t>     his famous Feynman diagrams. </a:t>
-            </a:r>
-          </a:p>
-          <a:p>
-            <a:pPr lvl="0">
-              <a:buNone/>
-            </a:pPr>
-            <a:endParaRPr lang="bg-BG" dirty="0" smtClean="0"/>
-          </a:p>
-          <a:p>
-            <a:pPr lvl="0"/>
-            <a:r>
-              <a:rPr lang="en-US" dirty="0" smtClean="0"/>
-              <a:t>Once he manages to collect something, his IQ value arises. </a:t>
-            </a:r>
-            <a:endParaRPr lang="bg-BG" dirty="0" smtClean="0"/>
-          </a:p>
-          <a:p>
-            <a:pPr lvl="0"/>
-            <a:r>
-              <a:rPr lang="en-US" dirty="0" smtClean="0"/>
-              <a:t>In the same time some obstacles appear – some books  	or equations or diagram falls from the top part of the screen. </a:t>
-            </a:r>
-            <a:endParaRPr lang="bg-BG" dirty="0" smtClean="0"/>
-          </a:p>
-          <a:p>
-            <a:pPr lvl="0"/>
-            <a:r>
-              <a:rPr lang="en-US" dirty="0" smtClean="0"/>
-              <a:t>Ones the Professor meets these obstacles, his IQ decreases with certain value. </a:t>
-            </a:r>
-            <a:endParaRPr lang="bg-BG" dirty="0" smtClean="0"/>
-          </a:p>
-          <a:p>
-            <a:pPr lvl="0"/>
-            <a:r>
-              <a:rPr lang="en-US" dirty="0" smtClean="0"/>
-              <a:t>At the end of this level, when the boundary IQ value is reached, the Professor Feynman gets a coin with Nobel face drawn on it.  </a:t>
-            </a:r>
-            <a:endParaRPr lang="bg-BG" dirty="0" smtClean="0"/>
-          </a:p>
-          <a:p>
-            <a:pPr lvl="0"/>
-            <a:r>
-              <a:rPr lang="en-US" dirty="0" smtClean="0"/>
-              <a:t>During all the time a suitable music for all events is playing. </a:t>
-            </a:r>
-            <a:endParaRPr lang="bg-BG" dirty="0" smtClean="0"/>
-          </a:p>
-          <a:p>
-            <a:pPr>
-              <a:buNone/>
-            </a:pPr>
-            <a:endParaRPr lang="en-US" dirty="0" smtClean="0"/>
-          </a:p>
-          <a:p>
-            <a:endParaRPr lang="bg-BG" dirty="0" smtClean="0"/>
-          </a:p>
-          <a:p>
-            <a:endParaRPr lang="en-US" dirty="0" smtClean="0"/>
-          </a:p>
-        </p:txBody>
-      </p:sp>
-      <p:sp>
-        <p:nvSpPr>
-          <p:cNvPr id="2" name="Slide Number Placeholder 1"/>
-          <p:cNvSpPr>
-            <a:spLocks noGrp="1"/>
-          </p:cNvSpPr>
-          <p:nvPr>
-            <p:ph type="sldNum" sz="quarter" idx="4"/>
-          </p:nvPr>
-        </p:nvSpPr>
-        <p:spPr>
-          <a:xfrm>
-            <a:off x="11566412" y="6525002"/>
-            <a:ext cx="428822" cy="196477"/>
-          </a:xfrm>
-        </p:spPr>
-        <p:txBody>
-          <a:bodyPr/>
-          <a:lstStyle/>
-          <a:p>
-            <a:fld id="{C014DD1E-5D91-48A3-AD6D-45FBA980D106}" type="slidenum">
-              <a:rPr lang="en-US" smtClean="0"/>
-              <a:pPr/>
-              <a:t>8</a:t>
             </a:fld>
             <a:endParaRPr lang="en-US" dirty="0"/>
           </a:p>
@@ -5855,7 +5779,7 @@
         </p:blipFill>
         <p:spPr>
           <a:xfrm>
-            <a:off x="2817812" y="1676400"/>
+            <a:off x="2817812" y="1828800"/>
             <a:ext cx="1143000" cy="1143000"/>
           </a:xfrm>
           <a:prstGeom prst="rect">
@@ -5928,7 +5852,7 @@
         </p:blipFill>
         <p:spPr bwMode="auto">
           <a:xfrm>
-            <a:off x="3198812" y="5486400"/>
+            <a:off x="3275012" y="5638800"/>
             <a:ext cx="533400" cy="533400"/>
           </a:xfrm>
           <a:prstGeom prst="rect">
@@ -5940,7 +5864,7 @@
     </p:spTree>
     <p:extLst>
       <p:ext uri="{BB962C8B-B14F-4D97-AF65-F5344CB8AC3E}">
-        <p14:creationId xmlns:p14="http://schemas.microsoft.com/office/powerpoint/2010/main" xmlns="" val="1646986932"/>
+        <p14:creationId xmlns="" xmlns:p14="http://schemas.microsoft.com/office/powerpoint/2010/main" val="1646986932"/>
       </p:ext>
     </p:extLst>
   </p:cSld>
@@ -5948,7 +5872,311 @@
     <a:masterClrMapping/>
   </p:clrMapOvr>
   <mc:AlternateContent xmlns:mc="http://schemas.openxmlformats.org/markup-compatibility/2006">
-    <mc:Choice xmlns:p14="http://schemas.microsoft.com/office/powerpoint/2010/main" xmlns="" Requires="p14">
+    <mc:Choice xmlns="" xmlns:p14="http://schemas.microsoft.com/office/powerpoint/2010/main" Requires="p14">
+      <p:transition p14:dur="0"/>
+    </mc:Choice>
+    <mc:Fallback>
+      <p:transition/>
+    </mc:Fallback>
+  </mc:AlternateContent>
+  <p:timing>
+    <p:tnLst>
+      <p:par>
+        <p:cTn id="1" dur="indefinite" restart="never" nodeType="tmRoot"/>
+      </p:par>
+    </p:tnLst>
+  </p:timing>
+</p:sld>
+</file>
+
+<file path=ppt/slides/slide8.xml><?xml version="1.0" encoding="utf-8"?>
+<p:sld xmlns:a="http://schemas.openxmlformats.org/drawingml/2006/main" xmlns:r="http://schemas.openxmlformats.org/officeDocument/2006/relationships" xmlns:p="http://schemas.openxmlformats.org/presentationml/2006/main" showMasterSp="0">
+  <p:cSld>
+    <p:spTree>
+      <p:nvGrpSpPr>
+        <p:cNvPr id="1" name=""/>
+        <p:cNvGrpSpPr/>
+        <p:nvPr/>
+      </p:nvGrpSpPr>
+      <p:grpSpPr>
+        <a:xfrm>
+          <a:off x="0" y="0"/>
+          <a:ext cx="0" cy="0"/>
+          <a:chOff x="0" y="0"/>
+          <a:chExt cx="0" cy="0"/>
+        </a:xfrm>
+      </p:grpSpPr>
+      <p:sp>
+        <p:nvSpPr>
+          <p:cNvPr id="444418" name="Rectangle 2"/>
+          <p:cNvSpPr>
+            <a:spLocks noGrp="1" noChangeArrowheads="1"/>
+          </p:cNvSpPr>
+          <p:nvPr>
+            <p:ph type="title"/>
+          </p:nvPr>
+        </p:nvSpPr>
+        <p:spPr/>
+        <p:txBody>
+          <a:bodyPr>
+            <a:normAutofit/>
+          </a:bodyPr>
+          <a:lstStyle/>
+          <a:p>
+            <a:r>
+              <a:rPr lang="en-US" dirty="0" smtClean="0"/>
+              <a:t>How we have worked</a:t>
+            </a:r>
+            <a:endParaRPr lang="bg-BG" dirty="0"/>
+          </a:p>
+        </p:txBody>
+      </p:sp>
+      <p:sp>
+        <p:nvSpPr>
+          <p:cNvPr id="444419" name="Rectangle 3"/>
+          <p:cNvSpPr>
+            <a:spLocks noGrp="1" noChangeArrowheads="1"/>
+          </p:cNvSpPr>
+          <p:nvPr>
+            <p:ph idx="4294967295"/>
+          </p:nvPr>
+        </p:nvSpPr>
+        <p:spPr>
+          <a:xfrm>
+            <a:off x="190413" y="1191467"/>
+            <a:ext cx="11804822" cy="5530010"/>
+          </a:xfrm>
+        </p:spPr>
+        <p:txBody>
+          <a:bodyPr>
+            <a:normAutofit fontScale="62500" lnSpcReduction="20000"/>
+          </a:bodyPr>
+          <a:lstStyle/>
+          <a:p>
+            <a:pPr>
+              <a:buNone/>
+            </a:pPr>
+            <a:r>
+              <a:rPr lang="en-US" sz="4800" b="1" dirty="0" smtClean="0">
+                <a:solidFill>
+                  <a:srgbClr val="FFFF00"/>
+                </a:solidFill>
+              </a:rPr>
+              <a:t>This was a real teamwork project. All of us have been working actively, but in different ways</a:t>
+            </a:r>
+          </a:p>
+          <a:p>
+            <a:r>
+              <a:rPr lang="en-US" dirty="0" smtClean="0"/>
+              <a:t>Alexander – actively participated in </a:t>
+            </a:r>
+            <a:r>
+              <a:rPr lang="en-US" dirty="0" smtClean="0"/>
+              <a:t>code writing, the </a:t>
+            </a:r>
+            <a:r>
+              <a:rPr lang="en-US" dirty="0" smtClean="0"/>
+              <a:t>team discussions </a:t>
+            </a:r>
+            <a:r>
+              <a:rPr lang="en-US" dirty="0" smtClean="0"/>
+              <a:t>and</a:t>
+            </a:r>
+            <a:r>
+              <a:rPr lang="en-US" dirty="0" smtClean="0"/>
+              <a:t>  game scenario description.</a:t>
+            </a:r>
+            <a:endParaRPr lang="en-US" dirty="0" smtClean="0"/>
+          </a:p>
+          <a:p>
+            <a:r>
+              <a:rPr lang="en-US" dirty="0" err="1" smtClean="0"/>
+              <a:t>Aneliya</a:t>
+            </a:r>
+            <a:r>
+              <a:rPr lang="en-US" dirty="0" smtClean="0"/>
+              <a:t> – </a:t>
+            </a:r>
+            <a:r>
+              <a:rPr lang="en-US" dirty="0" smtClean="0"/>
+              <a:t> </a:t>
+            </a:r>
+            <a:r>
+              <a:rPr lang="en-US" dirty="0" smtClean="0"/>
+              <a:t>actively participated in the </a:t>
+            </a:r>
+            <a:r>
+              <a:rPr lang="en-US" dirty="0" smtClean="0"/>
+              <a:t>discussions, gave </a:t>
+            </a:r>
+            <a:r>
+              <a:rPr lang="en-US" dirty="0" smtClean="0"/>
+              <a:t>the initial idea about the </a:t>
+            </a:r>
+            <a:r>
+              <a:rPr lang="en-US" dirty="0" smtClean="0"/>
+              <a:t>game, </a:t>
+            </a:r>
+            <a:r>
+              <a:rPr lang="en-US" dirty="0" smtClean="0"/>
+              <a:t>searching resources on the net and code writing.  </a:t>
+            </a:r>
+          </a:p>
+          <a:p>
+            <a:r>
+              <a:rPr lang="en-US" b="1" dirty="0" smtClean="0">
+                <a:solidFill>
+                  <a:schemeClr val="accent1">
+                    <a:lumMod val="75000"/>
+                  </a:schemeClr>
+                </a:solidFill>
+              </a:rPr>
+              <a:t>*</a:t>
+            </a:r>
+            <a:r>
+              <a:rPr lang="en-US" dirty="0" err="1" smtClean="0">
+                <a:solidFill>
+                  <a:schemeClr val="accent1">
+                    <a:lumMod val="75000"/>
+                  </a:schemeClr>
+                </a:solidFill>
+              </a:rPr>
+              <a:t>Borislav</a:t>
+            </a:r>
+            <a:r>
+              <a:rPr lang="en-US" dirty="0" smtClean="0">
+                <a:solidFill>
+                  <a:schemeClr val="accent1">
+                    <a:lumMod val="75000"/>
+                  </a:schemeClr>
+                </a:solidFill>
+              </a:rPr>
+              <a:t>, </a:t>
+            </a:r>
+            <a:r>
+              <a:rPr lang="en-US" dirty="0" err="1" smtClean="0">
+                <a:solidFill>
+                  <a:schemeClr val="accent1">
+                    <a:lumMod val="75000"/>
+                  </a:schemeClr>
+                </a:solidFill>
+              </a:rPr>
+              <a:t>Kalina</a:t>
+            </a:r>
+            <a:r>
+              <a:rPr lang="en-US" dirty="0" smtClean="0">
+                <a:solidFill>
+                  <a:schemeClr val="accent1">
+                    <a:lumMod val="75000"/>
+                  </a:schemeClr>
+                </a:solidFill>
+              </a:rPr>
+              <a:t> – participated  once in the Skype discussion</a:t>
+            </a:r>
+          </a:p>
+          <a:p>
+            <a:r>
+              <a:rPr lang="en-US" dirty="0" err="1" smtClean="0"/>
+              <a:t>Mariya</a:t>
+            </a:r>
+            <a:r>
+              <a:rPr lang="en-US" dirty="0" smtClean="0"/>
+              <a:t> – actively participated in all discussions, main contributor to the very important and time consuming  work on editing of almost all images used in the game.</a:t>
+            </a:r>
+          </a:p>
+          <a:p>
+            <a:r>
+              <a:rPr lang="en-US" dirty="0" err="1" smtClean="0"/>
+              <a:t>Neli</a:t>
+            </a:r>
+            <a:r>
+              <a:rPr lang="en-US" dirty="0" smtClean="0"/>
+              <a:t> – participated actively in team discussions, searching for images and other useful resources on the net, participated in describing project documentation. </a:t>
+            </a:r>
+          </a:p>
+          <a:p>
+            <a:r>
+              <a:rPr lang="en-US" dirty="0" err="1" smtClean="0"/>
+              <a:t>Plamen</a:t>
+            </a:r>
+            <a:r>
+              <a:rPr lang="en-US" dirty="0" smtClean="0"/>
+              <a:t>  - created the </a:t>
+            </a:r>
+            <a:r>
+              <a:rPr lang="en-US" dirty="0" err="1" smtClean="0"/>
+              <a:t>sceleton</a:t>
+            </a:r>
+            <a:r>
+              <a:rPr lang="en-US" dirty="0" smtClean="0"/>
+              <a:t> of the game code, gave the name of the game and main ideas about used platform, participated in team discussions, etc.  </a:t>
+            </a:r>
+          </a:p>
+          <a:p>
+            <a:r>
+              <a:rPr lang="en-US" dirty="0" err="1" smtClean="0"/>
+              <a:t>Stiliyan</a:t>
+            </a:r>
+            <a:r>
+              <a:rPr lang="en-US" dirty="0" smtClean="0"/>
+              <a:t>  - actively participated in building the </a:t>
+            </a:r>
+            <a:r>
+              <a:rPr lang="en-US" dirty="0" err="1" smtClean="0"/>
+              <a:t>sceleton</a:t>
+            </a:r>
+            <a:r>
+              <a:rPr lang="en-US" dirty="0" smtClean="0"/>
+              <a:t> of the game code,  code writing , team discussions, etc. </a:t>
+            </a:r>
+            <a:endParaRPr lang="bg-BG" dirty="0" smtClean="0"/>
+          </a:p>
+          <a:p>
+            <a:endParaRPr lang="en-US" dirty="0" smtClean="0"/>
+          </a:p>
+        </p:txBody>
+      </p:sp>
+      <p:sp>
+        <p:nvSpPr>
+          <p:cNvPr id="2" name="Slide Number Placeholder 1"/>
+          <p:cNvSpPr>
+            <a:spLocks noGrp="1"/>
+          </p:cNvSpPr>
+          <p:nvPr>
+            <p:ph type="sldNum" sz="quarter" idx="4"/>
+          </p:nvPr>
+        </p:nvSpPr>
+        <p:spPr>
+          <a:xfrm>
+            <a:off x="11566412" y="6525002"/>
+            <a:ext cx="428822" cy="196477"/>
+          </a:xfrm>
+        </p:spPr>
+        <p:txBody>
+          <a:bodyPr/>
+          <a:lstStyle/>
+          <a:p>
+            <a:fld id="{C014DD1E-5D91-48A3-AD6D-45FBA980D106}" type="slidenum">
+              <a:rPr lang="en-US" smtClean="0"/>
+              <a:pPr/>
+              <a:t>8</a:t>
+            </a:fld>
+            <a:endParaRPr lang="en-US" dirty="0"/>
+          </a:p>
+        </p:txBody>
+      </p:sp>
+    </p:spTree>
+    <p:extLst>
+      <p:ext uri="{BB962C8B-B14F-4D97-AF65-F5344CB8AC3E}">
+        <p14:creationId xmlns="" xmlns:p14="http://schemas.microsoft.com/office/powerpoint/2010/main" val="1646986932"/>
+      </p:ext>
+    </p:extLst>
+  </p:cSld>
+  <p:clrMapOvr>
+    <a:masterClrMapping/>
+  </p:clrMapOvr>
+  <mc:AlternateContent xmlns:mc="http://schemas.openxmlformats.org/markup-compatibility/2006">
+    <mc:Choice xmlns="" xmlns:p14="http://schemas.microsoft.com/office/powerpoint/2010/main" Requires="p14">
       <p:transition p14:dur="0"/>
     </mc:Choice>
     <mc:Fallback>
@@ -5984,31 +6212,6 @@
       </p:grpSpPr>
       <p:sp>
         <p:nvSpPr>
-          <p:cNvPr id="444418" name="Rectangle 2"/>
-          <p:cNvSpPr>
-            <a:spLocks noGrp="1" noChangeArrowheads="1"/>
-          </p:cNvSpPr>
-          <p:nvPr>
-            <p:ph type="title"/>
-          </p:nvPr>
-        </p:nvSpPr>
-        <p:spPr/>
-        <p:txBody>
-          <a:bodyPr>
-            <a:normAutofit/>
-          </a:bodyPr>
-          <a:lstStyle/>
-          <a:p>
-            <a:r>
-              <a:rPr lang="en-US" dirty="0" smtClean="0"/>
-              <a:t>How we have worked</a:t>
-            </a:r>
-            <a:endParaRPr lang="bg-BG" dirty="0"/>
-          </a:p>
-        </p:txBody>
-      </p:sp>
-      <p:sp>
-        <p:nvSpPr>
           <p:cNvPr id="444419" name="Rectangle 3"/>
           <p:cNvSpPr>
             <a:spLocks noGrp="1" noChangeArrowheads="1"/>
@@ -6025,211 +6228,22 @@
         </p:spPr>
         <p:txBody>
           <a:bodyPr>
-            <a:normAutofit fontScale="62500" lnSpcReduction="20000"/>
+            <a:normAutofit/>
           </a:bodyPr>
           <a:lstStyle/>
           <a:p>
             <a:pPr>
               <a:buNone/>
             </a:pPr>
-            <a:r>
-              <a:rPr lang="en-US" sz="4800" b="1" dirty="0" smtClean="0">
-                <a:solidFill>
-                  <a:srgbClr val="FFFF00"/>
-                </a:solidFill>
-              </a:rPr>
-              <a:t>This was a real teamwork project. All of us </a:t>
-            </a:r>
-            <a:r>
-              <a:rPr lang="en-US" sz="4800" b="1" dirty="0" smtClean="0">
-                <a:solidFill>
-                  <a:srgbClr val="FFFF00"/>
-                </a:solidFill>
-              </a:rPr>
-              <a:t>have </a:t>
-            </a:r>
-            <a:r>
-              <a:rPr lang="en-US" sz="4800" b="1" dirty="0" smtClean="0">
-                <a:solidFill>
-                  <a:srgbClr val="FFFF00"/>
-                </a:solidFill>
-              </a:rPr>
-              <a:t>been working actively, but in different ways</a:t>
-            </a:r>
-          </a:p>
-          <a:p>
-            <a:r>
-              <a:rPr lang="en-US" dirty="0" smtClean="0"/>
-              <a:t>Alexander – actively participated in the team discussions and writing the game code</a:t>
-            </a:r>
-          </a:p>
-          <a:p>
-            <a:r>
-              <a:rPr lang="en-US" dirty="0" err="1" smtClean="0"/>
-              <a:t>Aneliya</a:t>
-            </a:r>
-            <a:r>
-              <a:rPr lang="en-US" dirty="0" smtClean="0"/>
-              <a:t> – created our group in Skype, gave the initial idea about the game, actively participated in the discussions, searching resources on the net and code writing.  </a:t>
-            </a:r>
-          </a:p>
-          <a:p>
-            <a:r>
-              <a:rPr lang="en-US" b="1" dirty="0" smtClean="0">
-                <a:solidFill>
-                  <a:schemeClr val="accent1">
-                    <a:lumMod val="75000"/>
-                  </a:schemeClr>
-                </a:solidFill>
-              </a:rPr>
-              <a:t>*</a:t>
-            </a:r>
-            <a:r>
-              <a:rPr lang="en-US" dirty="0" err="1" smtClean="0">
-                <a:solidFill>
-                  <a:schemeClr val="accent1">
-                    <a:lumMod val="75000"/>
-                  </a:schemeClr>
-                </a:solidFill>
-              </a:rPr>
-              <a:t>Borislav</a:t>
-            </a:r>
-            <a:r>
-              <a:rPr lang="en-US" dirty="0" smtClean="0">
-                <a:solidFill>
-                  <a:schemeClr val="accent1">
-                    <a:lumMod val="75000"/>
-                  </a:schemeClr>
-                </a:solidFill>
-              </a:rPr>
-              <a:t>, </a:t>
-            </a:r>
-            <a:r>
-              <a:rPr lang="en-US" dirty="0" err="1" smtClean="0">
-                <a:solidFill>
-                  <a:schemeClr val="accent1">
-                    <a:lumMod val="75000"/>
-                  </a:schemeClr>
-                </a:solidFill>
-              </a:rPr>
-              <a:t>Kalina</a:t>
-            </a:r>
-            <a:r>
-              <a:rPr lang="en-US" dirty="0" smtClean="0">
-                <a:solidFill>
-                  <a:schemeClr val="accent1">
-                    <a:lumMod val="75000"/>
-                  </a:schemeClr>
-                </a:solidFill>
-              </a:rPr>
-              <a:t> – </a:t>
-            </a:r>
-            <a:r>
-              <a:rPr lang="en-US" dirty="0" smtClean="0">
-                <a:solidFill>
-                  <a:schemeClr val="accent1">
-                    <a:lumMod val="75000"/>
-                  </a:schemeClr>
-                </a:solidFill>
-              </a:rPr>
-              <a:t>participated </a:t>
-            </a:r>
-            <a:r>
-              <a:rPr lang="en-US" dirty="0" smtClean="0">
-                <a:solidFill>
-                  <a:schemeClr val="accent1">
-                    <a:lumMod val="75000"/>
-                  </a:schemeClr>
-                </a:solidFill>
-              </a:rPr>
-              <a:t> once in the Skype </a:t>
-            </a:r>
-            <a:r>
-              <a:rPr lang="en-US" dirty="0" smtClean="0">
-                <a:solidFill>
-                  <a:schemeClr val="accent1">
-                    <a:lumMod val="75000"/>
-                  </a:schemeClr>
-                </a:solidFill>
-              </a:rPr>
-              <a:t>discussion</a:t>
-            </a:r>
-          </a:p>
-          <a:p>
-            <a:r>
-              <a:rPr lang="en-US" dirty="0" err="1" smtClean="0"/>
-              <a:t>Mariya</a:t>
-            </a:r>
-            <a:r>
-              <a:rPr lang="en-US" dirty="0" smtClean="0"/>
-              <a:t> </a:t>
-            </a:r>
-            <a:r>
-              <a:rPr lang="en-US" dirty="0" smtClean="0"/>
-              <a:t>– actively participated in all discussions, main contributor to the very important and time consuming  work on editing of almost all images used in the game.</a:t>
-            </a:r>
-          </a:p>
-          <a:p>
-            <a:r>
-              <a:rPr lang="en-US" dirty="0" err="1" smtClean="0"/>
-              <a:t>Neli</a:t>
-            </a:r>
-            <a:r>
-              <a:rPr lang="en-US" dirty="0" smtClean="0"/>
-              <a:t> – participated actively in team discussions, searching for images and other useful resources on the net, participated in describing project documentation. </a:t>
-            </a:r>
-          </a:p>
-          <a:p>
-            <a:r>
-              <a:rPr lang="en-US" dirty="0" err="1" smtClean="0"/>
-              <a:t>Plamen</a:t>
-            </a:r>
-            <a:r>
-              <a:rPr lang="en-US" dirty="0" smtClean="0"/>
-              <a:t>  - created the </a:t>
-            </a:r>
-            <a:r>
-              <a:rPr lang="en-US" dirty="0" err="1" smtClean="0"/>
-              <a:t>sceleton</a:t>
-            </a:r>
-            <a:r>
-              <a:rPr lang="en-US" dirty="0" smtClean="0"/>
-              <a:t> of the game code, gave the name of the game and main ideas about used platform, participated in team discussions, etc.  </a:t>
-            </a:r>
-          </a:p>
-          <a:p>
-            <a:r>
-              <a:rPr lang="en-US" dirty="0" err="1" smtClean="0"/>
-              <a:t>Stiliyan</a:t>
-            </a:r>
-            <a:r>
-              <a:rPr lang="en-US" dirty="0" smtClean="0"/>
-              <a:t>  - actively participated in </a:t>
-            </a:r>
-            <a:r>
-              <a:rPr lang="en-US" dirty="0" smtClean="0"/>
-              <a:t>building </a:t>
-            </a:r>
-            <a:r>
-              <a:rPr lang="en-US" dirty="0" smtClean="0"/>
-              <a:t>the </a:t>
-            </a:r>
-            <a:r>
-              <a:rPr lang="en-US" dirty="0" err="1" smtClean="0"/>
-              <a:t>sceleton</a:t>
-            </a:r>
-            <a:r>
-              <a:rPr lang="en-US" dirty="0" smtClean="0"/>
-              <a:t> of the game </a:t>
-            </a:r>
-            <a:r>
-              <a:rPr lang="en-US" dirty="0" smtClean="0"/>
-              <a:t>code,  code writing , team </a:t>
-            </a:r>
-            <a:r>
-              <a:rPr lang="en-US" dirty="0" smtClean="0"/>
-              <a:t>discussions, etc. </a:t>
-            </a:r>
+            <a:endParaRPr lang="bg-BG" dirty="0" smtClean="0"/>
+          </a:p>
+          <a:p>
+            <a:pPr>
+              <a:buNone/>
+            </a:pPr>
+            <a:endParaRPr lang="en-US" dirty="0" smtClean="0"/>
+          </a:p>
+          <a:p>
             <a:endParaRPr lang="bg-BG" dirty="0" smtClean="0"/>
           </a:p>
           <a:p>
@@ -6266,10 +6280,109 @@
           </a:p>
         </p:txBody>
       </p:sp>
+      <p:sp>
+        <p:nvSpPr>
+          <p:cNvPr id="5" name="Rectangle 2"/>
+          <p:cNvSpPr txBox="1">
+            <a:spLocks noChangeArrowheads="1"/>
+          </p:cNvSpPr>
+          <p:nvPr/>
+        </p:nvSpPr>
+        <p:spPr>
+          <a:xfrm>
+            <a:off x="989012" y="3200400"/>
+            <a:ext cx="9577597" cy="1110780"/>
+          </a:xfrm>
+          <a:prstGeom prst="rect">
+            <a:avLst/>
+          </a:prstGeom>
+        </p:spPr>
+        <p:txBody>
+          <a:bodyPr vert="horz" lIns="108000" tIns="36000" rIns="108000" bIns="36000" rtlCol="0" anchor="ctr" anchorCtr="0">
+            <a:normAutofit/>
+          </a:bodyPr>
+          <a:lstStyle/>
+          <a:p>
+            <a:pPr marL="0" marR="0" lvl="0" indent="0" algn="ctr" defTabSz="1218987" rtl="0" eaLnBrk="1" fontAlgn="auto" latinLnBrk="0" hangingPunct="1">
+              <a:lnSpc>
+                <a:spcPct val="90000"/>
+              </a:lnSpc>
+              <a:spcBef>
+                <a:spcPct val="0"/>
+              </a:spcBef>
+              <a:spcAft>
+                <a:spcPts val="0"/>
+              </a:spcAft>
+              <a:buClrTx/>
+              <a:buSzTx/>
+              <a:buFontTx/>
+              <a:buNone/>
+              <a:tabLst/>
+              <a:defRPr/>
+            </a:pPr>
+            <a:r>
+              <a:rPr lang="en-US" sz="4000" b="1" noProof="0" dirty="0" smtClean="0">
+                <a:solidFill>
+                  <a:srgbClr val="F3BE60"/>
+                </a:solidFill>
+                <a:latin typeface="+mj-lt"/>
+                <a:ea typeface="+mj-ea"/>
+                <a:cs typeface="+mj-cs"/>
+              </a:rPr>
+              <a:t>Live demo</a:t>
+            </a:r>
+            <a:endParaRPr kumimoji="0" lang="bg-BG" sz="4000" b="1" i="0" u="none" strike="noStrike" kern="1200" cap="none" spc="0" normalizeH="0" baseline="0" noProof="0" dirty="0">
+              <a:ln>
+                <a:noFill/>
+              </a:ln>
+              <a:solidFill>
+                <a:srgbClr val="F3BE60"/>
+              </a:solidFill>
+              <a:effectLst/>
+              <a:uLnTx/>
+              <a:uFillTx/>
+              <a:latin typeface="+mj-lt"/>
+              <a:ea typeface="+mj-ea"/>
+              <a:cs typeface="+mj-cs"/>
+            </a:endParaRPr>
+          </a:p>
+        </p:txBody>
+      </p:sp>
+      <p:sp>
+        <p:nvSpPr>
+          <p:cNvPr id="7" name="Title 4"/>
+          <p:cNvSpPr>
+            <a:spLocks noGrp="1"/>
+          </p:cNvSpPr>
+          <p:nvPr>
+            <p:ph type="title"/>
+          </p:nvPr>
+        </p:nvSpPr>
+        <p:spPr>
+          <a:xfrm>
+            <a:off x="989012" y="1752600"/>
+            <a:ext cx="9577597" cy="1110780"/>
+          </a:xfrm>
+        </p:spPr>
+        <p:txBody>
+          <a:bodyPr>
+            <a:normAutofit/>
+          </a:bodyPr>
+          <a:lstStyle/>
+          <a:p>
+            <a:pPr algn="ctr"/>
+            <a:r>
+              <a:rPr lang="en-US" dirty="0" smtClean="0"/>
+              <a:t>The adventures of Professor Feynman</a:t>
+            </a:r>
+            <a:endParaRPr lang="en-US" dirty="0"/>
+          </a:p>
+        </p:txBody>
+      </p:sp>
     </p:spTree>
     <p:extLst>
       <p:ext uri="{BB962C8B-B14F-4D97-AF65-F5344CB8AC3E}">
-        <p14:creationId xmlns:p14="http://schemas.microsoft.com/office/powerpoint/2010/main" xmlns="" val="1646986932"/>
+        <p14:creationId xmlns="" xmlns:p14="http://schemas.microsoft.com/office/powerpoint/2010/main" val="1646986932"/>
       </p:ext>
     </p:extLst>
   </p:cSld>
@@ -6277,7 +6390,7 @@
     <a:masterClrMapping/>
   </p:clrMapOvr>
   <mc:AlternateContent xmlns:mc="http://schemas.openxmlformats.org/markup-compatibility/2006">
-    <mc:Choice xmlns:p14="http://schemas.microsoft.com/office/powerpoint/2010/main" xmlns="" Requires="p14">
+    <mc:Choice xmlns="" xmlns:p14="http://schemas.microsoft.com/office/powerpoint/2010/main" Requires="p14">
       <p:transition p14:dur="0"/>
     </mc:Choice>
     <mc:Fallback>

</xml_diff>